<commit_message>
Added HPCC and Kraken Measurements
 Cleaned up the source and script files. Added results from HPCC
Stampede and Kraken
</commit_message>
<xml_diff>
--- a/docs/mmpi_images.pptx
+++ b/docs/mmpi_images.pptx
@@ -5,20 +5,40 @@
     <p:sldMasterId id="2147483648" r:id="rId1"/>
   </p:sldMasterIdLst>
   <p:sldIdLst>
-    <p:sldId id="259" r:id="rId2"/>
-    <p:sldId id="274" r:id="rId3"/>
-    <p:sldId id="260" r:id="rId4"/>
-    <p:sldId id="261" r:id="rId5"/>
-    <p:sldId id="272" r:id="rId6"/>
-    <p:sldId id="273" r:id="rId7"/>
-    <p:sldId id="264" r:id="rId8"/>
-    <p:sldId id="265" r:id="rId9"/>
-    <p:sldId id="266" r:id="rId10"/>
-    <p:sldId id="267" r:id="rId11"/>
-    <p:sldId id="268" r:id="rId12"/>
-    <p:sldId id="269" r:id="rId13"/>
-    <p:sldId id="270" r:id="rId14"/>
-    <p:sldId id="271" r:id="rId15"/>
+    <p:sldId id="304" r:id="rId2"/>
+    <p:sldId id="305" r:id="rId3"/>
+    <p:sldId id="301" r:id="rId4"/>
+    <p:sldId id="302" r:id="rId5"/>
+    <p:sldId id="303" r:id="rId6"/>
+    <p:sldId id="289" r:id="rId7"/>
+    <p:sldId id="290" r:id="rId8"/>
+    <p:sldId id="281" r:id="rId9"/>
+    <p:sldId id="264" r:id="rId10"/>
+    <p:sldId id="282" r:id="rId11"/>
+    <p:sldId id="265" r:id="rId12"/>
+    <p:sldId id="275" r:id="rId13"/>
+    <p:sldId id="266" r:id="rId14"/>
+    <p:sldId id="283" r:id="rId15"/>
+    <p:sldId id="267" r:id="rId16"/>
+    <p:sldId id="284" r:id="rId17"/>
+    <p:sldId id="268" r:id="rId18"/>
+    <p:sldId id="285" r:id="rId19"/>
+    <p:sldId id="269" r:id="rId20"/>
+    <p:sldId id="299" r:id="rId21"/>
+    <p:sldId id="300" r:id="rId22"/>
+    <p:sldId id="306" r:id="rId23"/>
+    <p:sldId id="307" r:id="rId24"/>
+    <p:sldId id="308" r:id="rId25"/>
+    <p:sldId id="309" r:id="rId26"/>
+    <p:sldId id="310" r:id="rId27"/>
+    <p:sldId id="291" r:id="rId28"/>
+    <p:sldId id="293" r:id="rId29"/>
+    <p:sldId id="292" r:id="rId30"/>
+    <p:sldId id="294" r:id="rId31"/>
+    <p:sldId id="296" r:id="rId32"/>
+    <p:sldId id="295" r:id="rId33"/>
+    <p:sldId id="297" r:id="rId34"/>
+    <p:sldId id="298" r:id="rId35"/>
   </p:sldIdLst>
   <p:sldSz cx="9144000" cy="6858000" type="screen4x3"/>
   <p:notesSz cx="6858000" cy="9144000"/>
@@ -301,7 +321,7 @@
           <a:p>
             <a:fld id="{55AF9381-8E09-8D43-A793-444A77EB8026}" type="datetimeFigureOut">
               <a:rPr lang="en-US" smtClean="0"/>
-              <a:t>3/27/14</a:t>
+              <a:t>3/28/14</a:t>
             </a:fld>
             <a:endParaRPr lang="en-US"/>
           </a:p>
@@ -471,7 +491,7 @@
           <a:p>
             <a:fld id="{55AF9381-8E09-8D43-A793-444A77EB8026}" type="datetimeFigureOut">
               <a:rPr lang="en-US" smtClean="0"/>
-              <a:t>3/27/14</a:t>
+              <a:t>3/28/14</a:t>
             </a:fld>
             <a:endParaRPr lang="en-US"/>
           </a:p>
@@ -651,7 +671,7 @@
           <a:p>
             <a:fld id="{55AF9381-8E09-8D43-A793-444A77EB8026}" type="datetimeFigureOut">
               <a:rPr lang="en-US" smtClean="0"/>
-              <a:t>3/27/14</a:t>
+              <a:t>3/28/14</a:t>
             </a:fld>
             <a:endParaRPr lang="en-US"/>
           </a:p>
@@ -821,7 +841,7 @@
           <a:p>
             <a:fld id="{55AF9381-8E09-8D43-A793-444A77EB8026}" type="datetimeFigureOut">
               <a:rPr lang="en-US" smtClean="0"/>
-              <a:t>3/27/14</a:t>
+              <a:t>3/28/14</a:t>
             </a:fld>
             <a:endParaRPr lang="en-US"/>
           </a:p>
@@ -1067,7 +1087,7 @@
           <a:p>
             <a:fld id="{55AF9381-8E09-8D43-A793-444A77EB8026}" type="datetimeFigureOut">
               <a:rPr lang="en-US" smtClean="0"/>
-              <a:t>3/27/14</a:t>
+              <a:t>3/28/14</a:t>
             </a:fld>
             <a:endParaRPr lang="en-US"/>
           </a:p>
@@ -1355,7 +1375,7 @@
           <a:p>
             <a:fld id="{55AF9381-8E09-8D43-A793-444A77EB8026}" type="datetimeFigureOut">
               <a:rPr lang="en-US" smtClean="0"/>
-              <a:t>3/27/14</a:t>
+              <a:t>3/28/14</a:t>
             </a:fld>
             <a:endParaRPr lang="en-US"/>
           </a:p>
@@ -1777,7 +1797,7 @@
           <a:p>
             <a:fld id="{55AF9381-8E09-8D43-A793-444A77EB8026}" type="datetimeFigureOut">
               <a:rPr lang="en-US" smtClean="0"/>
-              <a:t>3/27/14</a:t>
+              <a:t>3/28/14</a:t>
             </a:fld>
             <a:endParaRPr lang="en-US"/>
           </a:p>
@@ -1895,7 +1915,7 @@
           <a:p>
             <a:fld id="{55AF9381-8E09-8D43-A793-444A77EB8026}" type="datetimeFigureOut">
               <a:rPr lang="en-US" smtClean="0"/>
-              <a:t>3/27/14</a:t>
+              <a:t>3/28/14</a:t>
             </a:fld>
             <a:endParaRPr lang="en-US"/>
           </a:p>
@@ -1990,7 +2010,7 @@
           <a:p>
             <a:fld id="{55AF9381-8E09-8D43-A793-444A77EB8026}" type="datetimeFigureOut">
               <a:rPr lang="en-US" smtClean="0"/>
-              <a:t>3/27/14</a:t>
+              <a:t>3/28/14</a:t>
             </a:fld>
             <a:endParaRPr lang="en-US"/>
           </a:p>
@@ -2267,7 +2287,7 @@
           <a:p>
             <a:fld id="{55AF9381-8E09-8D43-A793-444A77EB8026}" type="datetimeFigureOut">
               <a:rPr lang="en-US" smtClean="0"/>
-              <a:t>3/27/14</a:t>
+              <a:t>3/28/14</a:t>
             </a:fld>
             <a:endParaRPr lang="en-US"/>
           </a:p>
@@ -2520,7 +2540,7 @@
           <a:p>
             <a:fld id="{55AF9381-8E09-8D43-A793-444A77EB8026}" type="datetimeFigureOut">
               <a:rPr lang="en-US" smtClean="0"/>
-              <a:t>3/27/14</a:t>
+              <a:t>3/28/14</a:t>
             </a:fld>
             <a:endParaRPr lang="en-US"/>
           </a:p>
@@ -2733,7 +2753,7 @@
           <a:p>
             <a:fld id="{55AF9381-8E09-8D43-A793-444A77EB8026}" type="datetimeFigureOut">
               <a:rPr lang="en-US" smtClean="0"/>
-              <a:t>3/27/14</a:t>
+              <a:t>3/28/14</a:t>
             </a:fld>
             <a:endParaRPr lang="en-US"/>
           </a:p>
@@ -3108,160 +3128,39 @@
           <a:chExt cx="0" cy="0"/>
         </a:xfrm>
       </p:grpSpPr>
-      <p:pic>
-        <p:nvPicPr>
-          <p:cNvPr id="5" name="Picture 4"/>
-          <p:cNvPicPr>
-            <a:picLocks noChangeAspect="1"/>
-          </p:cNvPicPr>
-          <p:nvPr/>
-        </p:nvPicPr>
-        <p:blipFill>
-          <a:blip r:embed="rId2">
-            <a:extLst>
-              <a:ext uri="{28A0092B-C50C-407E-A947-70E740481C1C}">
-                <a14:useLocalDpi xmlns:a14="http://schemas.microsoft.com/office/drawing/2010/main" val="0"/>
-              </a:ext>
-            </a:extLst>
-          </a:blip>
-          <a:stretch>
-            <a:fillRect/>
-          </a:stretch>
-        </p:blipFill>
-        <p:spPr>
-          <a:xfrm>
-            <a:off x="4588695" y="25230"/>
-            <a:ext cx="4566925" cy="3428999"/>
-          </a:xfrm>
-          <a:prstGeom prst="rect">
-            <a:avLst/>
-          </a:prstGeom>
-        </p:spPr>
-      </p:pic>
-      <p:pic>
-        <p:nvPicPr>
-          <p:cNvPr id="6" name="Picture 5"/>
-          <p:cNvPicPr>
-            <a:picLocks noChangeAspect="1"/>
-          </p:cNvPicPr>
-          <p:nvPr/>
-        </p:nvPicPr>
-        <p:blipFill>
-          <a:blip r:embed="rId3">
-            <a:extLst>
-              <a:ext uri="{28A0092B-C50C-407E-A947-70E740481C1C}">
-                <a14:useLocalDpi xmlns:a14="http://schemas.microsoft.com/office/drawing/2010/main" val="0"/>
-              </a:ext>
-            </a:extLst>
-          </a:blip>
-          <a:stretch>
-            <a:fillRect/>
-          </a:stretch>
-        </p:blipFill>
-        <p:spPr>
-          <a:xfrm>
-            <a:off x="21770" y="3462481"/>
-            <a:ext cx="4566924" cy="3428999"/>
-          </a:xfrm>
-          <a:prstGeom prst="rect">
-            <a:avLst/>
-          </a:prstGeom>
-        </p:spPr>
-      </p:pic>
-      <p:pic>
-        <p:nvPicPr>
-          <p:cNvPr id="7" name="Picture 6"/>
-          <p:cNvPicPr>
-            <a:picLocks noChangeAspect="1"/>
-          </p:cNvPicPr>
-          <p:nvPr/>
-        </p:nvPicPr>
-        <p:blipFill>
-          <a:blip r:embed="rId4">
-            <a:extLst>
-              <a:ext uri="{28A0092B-C50C-407E-A947-70E740481C1C}">
-                <a14:useLocalDpi xmlns:a14="http://schemas.microsoft.com/office/drawing/2010/main" val="0"/>
-              </a:ext>
-            </a:extLst>
-          </a:blip>
-          <a:stretch>
-            <a:fillRect/>
-          </a:stretch>
-        </p:blipFill>
-        <p:spPr>
-          <a:xfrm>
-            <a:off x="4588695" y="3471625"/>
-            <a:ext cx="4554747" cy="3419855"/>
-          </a:xfrm>
-          <a:prstGeom prst="rect">
-            <a:avLst/>
-          </a:prstGeom>
-        </p:spPr>
-      </p:pic>
-      <p:pic>
-        <p:nvPicPr>
-          <p:cNvPr id="10" name="Picture 9"/>
-          <p:cNvPicPr>
-            <a:picLocks noChangeAspect="1"/>
-          </p:cNvPicPr>
-          <p:nvPr/>
-        </p:nvPicPr>
-        <p:blipFill>
-          <a:blip r:embed="rId5">
-            <a:extLst>
-              <a:ext uri="{28A0092B-C50C-407E-A947-70E740481C1C}">
-                <a14:useLocalDpi xmlns:a14="http://schemas.microsoft.com/office/drawing/2010/main" val="0"/>
-              </a:ext>
-            </a:extLst>
-          </a:blip>
-          <a:stretch>
-            <a:fillRect/>
-          </a:stretch>
-        </p:blipFill>
-        <p:spPr>
-          <a:xfrm>
-            <a:off x="12" y="2"/>
-            <a:ext cx="4566918" cy="3428995"/>
-          </a:xfrm>
-          <a:prstGeom prst="rect">
-            <a:avLst/>
-          </a:prstGeom>
-        </p:spPr>
-      </p:pic>
-      <p:sp>
-        <p:nvSpPr>
-          <p:cNvPr id="11" name="TextBox 10"/>
-          <p:cNvSpPr txBox="1"/>
-          <p:nvPr/>
-        </p:nvSpPr>
-        <p:spPr>
-          <a:xfrm>
-            <a:off x="1269971" y="6505750"/>
-            <a:ext cx="7485756" cy="369332"/>
-          </a:xfrm>
-          <a:prstGeom prst="rect">
-            <a:avLst/>
-          </a:prstGeom>
-          <a:noFill/>
-        </p:spPr>
-        <p:txBody>
-          <a:bodyPr wrap="none" rtlCol="0">
-            <a:spAutoFit/>
+      <p:sp>
+        <p:nvSpPr>
+          <p:cNvPr id="2" name="Title 1"/>
+          <p:cNvSpPr>
+            <a:spLocks noGrp="1"/>
+          </p:cNvSpPr>
+          <p:nvPr>
+            <p:ph type="title"/>
+          </p:nvPr>
+        </p:nvSpPr>
+        <p:spPr/>
+        <p:txBody>
+          <a:bodyPr>
+            <a:normAutofit/>
           </a:bodyPr>
           <a:lstStyle/>
           <a:p>
             <a:r>
-              <a:rPr lang="en-US" dirty="0" smtClean="0"/>
-              <a:t>IBM Blue Gene/Q (ALCF Mira 2014) Nodes: 2 Cores/Node: 16 Total Cores: 32</a:t>
-            </a:r>
-            <a:endParaRPr lang="en-US" dirty="0"/>
+              <a:rPr lang="en-US" sz="3600" dirty="0"/>
+              <a:t>IBM IA64 Dual Processors (SDSC </a:t>
+            </a:r>
+            <a:r>
+              <a:rPr lang="en-US" sz="3600" dirty="0" smtClean="0"/>
+              <a:t>IA64)</a:t>
+            </a:r>
+            <a:endParaRPr lang="en-US" sz="3600" dirty="0"/>
           </a:p>
         </p:txBody>
       </p:sp>
     </p:spTree>
     <p:extLst>
       <p:ext uri="{BB962C8B-B14F-4D97-AF65-F5344CB8AC3E}">
-        <p14:creationId xmlns:p14="http://schemas.microsoft.com/office/powerpoint/2010/main" val="3983389237"/>
+        <p14:creationId xmlns:p14="http://schemas.microsoft.com/office/powerpoint/2010/main" val="2143557860"/>
       </p:ext>
     </p:extLst>
   </p:cSld>
@@ -3295,160 +3194,44 @@
           <a:chExt cx="0" cy="0"/>
         </a:xfrm>
       </p:grpSpPr>
-      <p:pic>
-        <p:nvPicPr>
-          <p:cNvPr id="5" name="Picture 4"/>
-          <p:cNvPicPr>
-            <a:picLocks noChangeAspect="1"/>
-          </p:cNvPicPr>
-          <p:nvPr/>
-        </p:nvPicPr>
-        <p:blipFill>
-          <a:blip r:embed="rId2">
-            <a:extLst>
-              <a:ext uri="{28A0092B-C50C-407E-A947-70E740481C1C}">
-                <a14:useLocalDpi xmlns:a14="http://schemas.microsoft.com/office/drawing/2010/main" val="0"/>
-              </a:ext>
-            </a:extLst>
-          </a:blip>
-          <a:stretch>
-            <a:fillRect/>
-          </a:stretch>
-        </p:blipFill>
-        <p:spPr>
-          <a:xfrm>
-            <a:off x="4588695" y="27133"/>
-            <a:ext cx="4566924" cy="3425193"/>
-          </a:xfrm>
-          <a:prstGeom prst="rect">
-            <a:avLst/>
-          </a:prstGeom>
-        </p:spPr>
-      </p:pic>
-      <p:pic>
-        <p:nvPicPr>
-          <p:cNvPr id="6" name="Picture 5"/>
-          <p:cNvPicPr>
-            <a:picLocks noChangeAspect="1"/>
-          </p:cNvPicPr>
-          <p:nvPr/>
-        </p:nvPicPr>
-        <p:blipFill>
-          <a:blip r:embed="rId3">
-            <a:extLst>
-              <a:ext uri="{28A0092B-C50C-407E-A947-70E740481C1C}">
-                <a14:useLocalDpi xmlns:a14="http://schemas.microsoft.com/office/drawing/2010/main" val="0"/>
-              </a:ext>
-            </a:extLst>
-          </a:blip>
-          <a:stretch>
-            <a:fillRect/>
-          </a:stretch>
-        </p:blipFill>
-        <p:spPr>
-          <a:xfrm>
-            <a:off x="21770" y="3464384"/>
-            <a:ext cx="4566924" cy="3425193"/>
-          </a:xfrm>
-          <a:prstGeom prst="rect">
-            <a:avLst/>
-          </a:prstGeom>
-        </p:spPr>
-      </p:pic>
-      <p:pic>
-        <p:nvPicPr>
-          <p:cNvPr id="7" name="Picture 6"/>
-          <p:cNvPicPr>
-            <a:picLocks noChangeAspect="1"/>
-          </p:cNvPicPr>
-          <p:nvPr/>
-        </p:nvPicPr>
-        <p:blipFill>
-          <a:blip r:embed="rId4">
-            <a:extLst>
-              <a:ext uri="{28A0092B-C50C-407E-A947-70E740481C1C}">
-                <a14:useLocalDpi xmlns:a14="http://schemas.microsoft.com/office/drawing/2010/main" val="0"/>
-              </a:ext>
-            </a:extLst>
-          </a:blip>
-          <a:stretch>
-            <a:fillRect/>
-          </a:stretch>
-        </p:blipFill>
-        <p:spPr>
-          <a:xfrm>
-            <a:off x="4588695" y="3473522"/>
-            <a:ext cx="4554748" cy="3416061"/>
-          </a:xfrm>
-          <a:prstGeom prst="rect">
-            <a:avLst/>
-          </a:prstGeom>
-        </p:spPr>
-      </p:pic>
-      <p:pic>
-        <p:nvPicPr>
-          <p:cNvPr id="10" name="Picture 9"/>
-          <p:cNvPicPr>
-            <a:picLocks noChangeAspect="1"/>
-          </p:cNvPicPr>
-          <p:nvPr/>
-        </p:nvPicPr>
-        <p:blipFill>
-          <a:blip r:embed="rId5">
-            <a:extLst>
-              <a:ext uri="{28A0092B-C50C-407E-A947-70E740481C1C}">
-                <a14:useLocalDpi xmlns:a14="http://schemas.microsoft.com/office/drawing/2010/main" val="0"/>
-              </a:ext>
-            </a:extLst>
-          </a:blip>
-          <a:stretch>
-            <a:fillRect/>
-          </a:stretch>
-        </p:blipFill>
-        <p:spPr>
-          <a:xfrm>
-            <a:off x="12" y="1905"/>
-            <a:ext cx="4566917" cy="3425188"/>
-          </a:xfrm>
-          <a:prstGeom prst="rect">
-            <a:avLst/>
-          </a:prstGeom>
-        </p:spPr>
-      </p:pic>
-      <p:sp>
-        <p:nvSpPr>
-          <p:cNvPr id="11" name="TextBox 10"/>
-          <p:cNvSpPr txBox="1"/>
-          <p:nvPr/>
-        </p:nvSpPr>
-        <p:spPr>
-          <a:xfrm>
-            <a:off x="389618" y="6520251"/>
-            <a:ext cx="8398153" cy="369332"/>
-          </a:xfrm>
-          <a:prstGeom prst="rect">
-            <a:avLst/>
-          </a:prstGeom>
-          <a:noFill/>
-        </p:spPr>
-        <p:txBody>
-          <a:bodyPr wrap="none" rtlCol="0">
-            <a:spAutoFit/>
+      <p:sp>
+        <p:nvSpPr>
+          <p:cNvPr id="2" name="Title 1"/>
+          <p:cNvSpPr>
+            <a:spLocks noGrp="1"/>
+          </p:cNvSpPr>
+          <p:nvPr>
+            <p:ph type="title"/>
+          </p:nvPr>
+        </p:nvSpPr>
+        <p:spPr>
+          <a:xfrm>
+            <a:off x="278343" y="274638"/>
+            <a:ext cx="8663423" cy="1143000"/>
+          </a:xfrm>
+        </p:spPr>
+        <p:txBody>
+          <a:bodyPr>
+            <a:noAutofit/>
           </a:bodyPr>
           <a:lstStyle/>
           <a:p>
             <a:r>
-              <a:rPr lang="en-US" dirty="0" smtClean="0"/>
-              <a:t>Sun Constellation Quad Core (TACC Ranger 2008) Node: 8 Cores/Node: 4 Total Cores: 32</a:t>
-            </a:r>
-            <a:endParaRPr lang="en-US" dirty="0"/>
+              <a:rPr lang="en-US" sz="3200" dirty="0"/>
+              <a:t>Cray XT3 MPP Dual Processor Nodes  (PSC Big </a:t>
+            </a:r>
+            <a:r>
+              <a:rPr lang="en-US" sz="3200" dirty="0" smtClean="0"/>
+              <a:t>Ben)</a:t>
+            </a:r>
+            <a:endParaRPr lang="en-US" sz="3200" dirty="0"/>
           </a:p>
         </p:txBody>
       </p:sp>
     </p:spTree>
     <p:extLst>
       <p:ext uri="{BB962C8B-B14F-4D97-AF65-F5344CB8AC3E}">
-        <p14:creationId xmlns:p14="http://schemas.microsoft.com/office/powerpoint/2010/main" val="2961089123"/>
+        <p14:creationId xmlns:p14="http://schemas.microsoft.com/office/powerpoint/2010/main" val="3459029994"/>
       </p:ext>
     </p:extLst>
   </p:cSld>
@@ -3505,7 +3288,7 @@
         <p:spPr>
           <a:xfrm>
             <a:off x="4588695" y="27133"/>
-            <a:ext cx="4566924" cy="3425193"/>
+            <a:ext cx="4566925" cy="3425194"/>
           </a:xfrm>
           <a:prstGeom prst="rect">
             <a:avLst/>
@@ -3595,7 +3378,7 @@
         <p:spPr>
           <a:xfrm>
             <a:off x="12" y="1905"/>
-            <a:ext cx="4566917" cy="3425187"/>
+            <a:ext cx="4566918" cy="3425189"/>
           </a:xfrm>
           <a:prstGeom prst="rect">
             <a:avLst/>
@@ -3610,8 +3393,8 @@
         </p:nvSpPr>
         <p:spPr>
           <a:xfrm>
-            <a:off x="1314911" y="6538394"/>
-            <a:ext cx="6861674" cy="369332"/>
+            <a:off x="36098" y="6523893"/>
+            <a:ext cx="9179917" cy="369332"/>
           </a:xfrm>
           <a:prstGeom prst="rect">
             <a:avLst/>
@@ -3626,15 +3409,15 @@
           <a:p>
             <a:r>
               <a:rPr lang="en-US" dirty="0" smtClean="0"/>
-              <a:t>Dell Dual Core – Dual Processor (TACC </a:t>
-            </a:r>
-            <a:r>
-              <a:rPr lang="en-US" dirty="0" err="1" smtClean="0"/>
-              <a:t>Lonestar</a:t>
+              <a:t>Cray XT3 MPP Dual Processor Nodes  (</a:t>
+            </a:r>
+            <a:r>
+              <a:rPr lang="en-US" dirty="0"/>
+              <a:t>P</a:t>
             </a:r>
             <a:r>
               <a:rPr lang="en-US" dirty="0" smtClean="0"/>
-              <a:t> 2008) Total Cores: 32</a:t>
+              <a:t>SC Big Ben 2008) Nodes: 8 Cores/Node: 2 Total Cores: 32</a:t>
             </a:r>
             <a:endParaRPr lang="en-US" dirty="0"/>
           </a:p>
@@ -3643,7 +3426,7 @@
     </p:spTree>
     <p:extLst>
       <p:ext uri="{BB962C8B-B14F-4D97-AF65-F5344CB8AC3E}">
-        <p14:creationId xmlns:p14="http://schemas.microsoft.com/office/powerpoint/2010/main" val="2387364442"/>
+        <p14:creationId xmlns:p14="http://schemas.microsoft.com/office/powerpoint/2010/main" val="2920618168"/>
       </p:ext>
     </p:extLst>
   </p:cSld>
@@ -3677,151 +3460,26 @@
           <a:chExt cx="0" cy="0"/>
         </a:xfrm>
       </p:grpSpPr>
-      <p:pic>
-        <p:nvPicPr>
-          <p:cNvPr id="5" name="Picture 4"/>
-          <p:cNvPicPr>
-            <a:picLocks noChangeAspect="1"/>
-          </p:cNvPicPr>
-          <p:nvPr/>
-        </p:nvPicPr>
-        <p:blipFill>
-          <a:blip r:embed="rId2">
-            <a:extLst>
-              <a:ext uri="{28A0092B-C50C-407E-A947-70E740481C1C}">
-                <a14:useLocalDpi xmlns:a14="http://schemas.microsoft.com/office/drawing/2010/main" val="0"/>
-              </a:ext>
-            </a:extLst>
-          </a:blip>
-          <a:stretch>
-            <a:fillRect/>
-          </a:stretch>
-        </p:blipFill>
-        <p:spPr>
-          <a:xfrm>
-            <a:off x="4588695" y="27133"/>
-            <a:ext cx="4566924" cy="3425193"/>
-          </a:xfrm>
-          <a:prstGeom prst="rect">
-            <a:avLst/>
-          </a:prstGeom>
-        </p:spPr>
-      </p:pic>
-      <p:pic>
-        <p:nvPicPr>
-          <p:cNvPr id="6" name="Picture 5"/>
-          <p:cNvPicPr>
-            <a:picLocks noChangeAspect="1"/>
-          </p:cNvPicPr>
-          <p:nvPr/>
-        </p:nvPicPr>
-        <p:blipFill>
-          <a:blip r:embed="rId3">
-            <a:extLst>
-              <a:ext uri="{28A0092B-C50C-407E-A947-70E740481C1C}">
-                <a14:useLocalDpi xmlns:a14="http://schemas.microsoft.com/office/drawing/2010/main" val="0"/>
-              </a:ext>
-            </a:extLst>
-          </a:blip>
-          <a:stretch>
-            <a:fillRect/>
-          </a:stretch>
-        </p:blipFill>
-        <p:spPr>
-          <a:xfrm>
-            <a:off x="21770" y="3464384"/>
-            <a:ext cx="4566924" cy="3425193"/>
-          </a:xfrm>
-          <a:prstGeom prst="rect">
-            <a:avLst/>
-          </a:prstGeom>
-        </p:spPr>
-      </p:pic>
-      <p:pic>
-        <p:nvPicPr>
-          <p:cNvPr id="7" name="Picture 6"/>
-          <p:cNvPicPr>
-            <a:picLocks noChangeAspect="1"/>
-          </p:cNvPicPr>
-          <p:nvPr/>
-        </p:nvPicPr>
-        <p:blipFill>
-          <a:blip r:embed="rId4">
-            <a:extLst>
-              <a:ext uri="{28A0092B-C50C-407E-A947-70E740481C1C}">
-                <a14:useLocalDpi xmlns:a14="http://schemas.microsoft.com/office/drawing/2010/main" val="0"/>
-              </a:ext>
-            </a:extLst>
-          </a:blip>
-          <a:stretch>
-            <a:fillRect/>
-          </a:stretch>
-        </p:blipFill>
-        <p:spPr>
-          <a:xfrm>
-            <a:off x="4588695" y="3473522"/>
-            <a:ext cx="4554748" cy="3416061"/>
-          </a:xfrm>
-          <a:prstGeom prst="rect">
-            <a:avLst/>
-          </a:prstGeom>
-        </p:spPr>
-      </p:pic>
-      <p:pic>
-        <p:nvPicPr>
-          <p:cNvPr id="10" name="Picture 9"/>
-          <p:cNvPicPr>
-            <a:picLocks noChangeAspect="1"/>
-          </p:cNvPicPr>
-          <p:nvPr/>
-        </p:nvPicPr>
-        <p:blipFill>
-          <a:blip r:embed="rId5">
-            <a:extLst>
-              <a:ext uri="{28A0092B-C50C-407E-A947-70E740481C1C}">
-                <a14:useLocalDpi xmlns:a14="http://schemas.microsoft.com/office/drawing/2010/main" val="0"/>
-              </a:ext>
-            </a:extLst>
-          </a:blip>
-          <a:stretch>
-            <a:fillRect/>
-          </a:stretch>
-        </p:blipFill>
-        <p:spPr>
-          <a:xfrm>
-            <a:off x="12" y="1905"/>
-            <a:ext cx="4566917" cy="3425187"/>
-          </a:xfrm>
-          <a:prstGeom prst="rect">
-            <a:avLst/>
-          </a:prstGeom>
-        </p:spPr>
-      </p:pic>
-      <p:sp>
-        <p:nvSpPr>
-          <p:cNvPr id="11" name="TextBox 10"/>
-          <p:cNvSpPr txBox="1"/>
-          <p:nvPr/>
-        </p:nvSpPr>
-        <p:spPr>
-          <a:xfrm>
-            <a:off x="1314911" y="6538394"/>
-            <a:ext cx="6614949" cy="369332"/>
-          </a:xfrm>
-          <a:prstGeom prst="rect">
-            <a:avLst/>
-          </a:prstGeom>
-          <a:noFill/>
-        </p:spPr>
-        <p:txBody>
-          <a:bodyPr wrap="none" rtlCol="0">
-            <a:spAutoFit/>
+      <p:sp>
+        <p:nvSpPr>
+          <p:cNvPr id="2" name="Title 1"/>
+          <p:cNvSpPr>
+            <a:spLocks noGrp="1"/>
+          </p:cNvSpPr>
+          <p:nvPr>
+            <p:ph type="title"/>
+          </p:nvPr>
+        </p:nvSpPr>
+        <p:spPr/>
+        <p:txBody>
+          <a:bodyPr>
+            <a:normAutofit fontScale="90000"/>
           </a:bodyPr>
           <a:lstStyle/>
           <a:p>
             <a:r>
               <a:rPr lang="en-US" dirty="0" smtClean="0"/>
-              <a:t>Intel 64 Quad Core – Dual Processor(NCSA Abe 2008) Total Cores: 32</a:t>
+              <a:t>IBM Blue Gene/L	(SDSC Blue Gene)</a:t>
             </a:r>
             <a:endParaRPr lang="en-US" dirty="0"/>
           </a:p>
@@ -3830,7 +3488,7 @@
     </p:spTree>
     <p:extLst>
       <p:ext uri="{BB962C8B-B14F-4D97-AF65-F5344CB8AC3E}">
-        <p14:creationId xmlns:p14="http://schemas.microsoft.com/office/powerpoint/2010/main" val="2851261483"/>
+        <p14:creationId xmlns:p14="http://schemas.microsoft.com/office/powerpoint/2010/main" val="3025847799"/>
       </p:ext>
     </p:extLst>
   </p:cSld>
@@ -3887,7 +3545,7 @@
         <p:spPr>
           <a:xfrm>
             <a:off x="4588695" y="27133"/>
-            <a:ext cx="4566924" cy="3425193"/>
+            <a:ext cx="4566925" cy="3425193"/>
           </a:xfrm>
           <a:prstGeom prst="rect">
             <a:avLst/>
@@ -3977,7 +3635,7 @@
         <p:spPr>
           <a:xfrm>
             <a:off x="12" y="1905"/>
-            <a:ext cx="4566916" cy="3425187"/>
+            <a:ext cx="4566918" cy="3425188"/>
           </a:xfrm>
           <a:prstGeom prst="rect">
             <a:avLst/>
@@ -3992,8 +3650,8 @@
         </p:nvSpPr>
         <p:spPr>
           <a:xfrm>
-            <a:off x="1314911" y="6538394"/>
-            <a:ext cx="5654876" cy="369332"/>
+            <a:off x="2422538" y="6520251"/>
+            <a:ext cx="5482766" cy="369332"/>
           </a:xfrm>
           <a:prstGeom prst="rect">
             <a:avLst/>
@@ -4008,7 +3666,7 @@
           <a:p>
             <a:r>
               <a:rPr lang="en-US" dirty="0" smtClean="0"/>
-              <a:t>IBM IA64 Dual Processors (SDSC IA64 2008) Total Cores: 32</a:t>
+              <a:t>IBM Blue Gene/L (SDSC Blue Gene 2008) Total Cores: 32</a:t>
             </a:r>
             <a:endParaRPr lang="en-US" dirty="0"/>
           </a:p>
@@ -4017,7 +3675,7 @@
     </p:spTree>
     <p:extLst>
       <p:ext uri="{BB962C8B-B14F-4D97-AF65-F5344CB8AC3E}">
-        <p14:creationId xmlns:p14="http://schemas.microsoft.com/office/powerpoint/2010/main" val="2628106630"/>
+        <p14:creationId xmlns:p14="http://schemas.microsoft.com/office/powerpoint/2010/main" val="4256941685"/>
       </p:ext>
     </p:extLst>
   </p:cSld>
@@ -4051,6 +3709,72 @@
           <a:chExt cx="0" cy="0"/>
         </a:xfrm>
       </p:grpSpPr>
+      <p:sp>
+        <p:nvSpPr>
+          <p:cNvPr id="2" name="Title 1"/>
+          <p:cNvSpPr>
+            <a:spLocks noGrp="1"/>
+          </p:cNvSpPr>
+          <p:nvPr>
+            <p:ph type="title"/>
+          </p:nvPr>
+        </p:nvSpPr>
+        <p:spPr/>
+        <p:txBody>
+          <a:bodyPr>
+            <a:normAutofit/>
+          </a:bodyPr>
+          <a:lstStyle/>
+          <a:p>
+            <a:r>
+              <a:rPr lang="en-US" sz="3200" dirty="0"/>
+              <a:t>Sun Constellation Quad Core (TACC </a:t>
+            </a:r>
+            <a:r>
+              <a:rPr lang="en-US" sz="3200" dirty="0" smtClean="0"/>
+              <a:t>Ranger)</a:t>
+            </a:r>
+            <a:endParaRPr lang="en-US" sz="3200" dirty="0"/>
+          </a:p>
+        </p:txBody>
+      </p:sp>
+    </p:spTree>
+    <p:extLst>
+      <p:ext uri="{BB962C8B-B14F-4D97-AF65-F5344CB8AC3E}">
+        <p14:creationId xmlns:p14="http://schemas.microsoft.com/office/powerpoint/2010/main" val="1036558049"/>
+      </p:ext>
+    </p:extLst>
+  </p:cSld>
+  <p:clrMapOvr>
+    <a:masterClrMapping/>
+  </p:clrMapOvr>
+  <p:timing>
+    <p:tnLst>
+      <p:par>
+        <p:cTn xmlns:p14="http://schemas.microsoft.com/office/powerpoint/2010/main" id="1" dur="indefinite" restart="never" nodeType="tmRoot"/>
+      </p:par>
+    </p:tnLst>
+  </p:timing>
+</p:sld>
+</file>
+
+<file path=ppt/slides/slide15.xml><?xml version="1.0" encoding="utf-8"?>
+<p:sld xmlns:a="http://schemas.openxmlformats.org/drawingml/2006/main" xmlns:r="http://schemas.openxmlformats.org/officeDocument/2006/relationships" xmlns:p="http://schemas.openxmlformats.org/presentationml/2006/main">
+  <p:cSld>
+    <p:spTree>
+      <p:nvGrpSpPr>
+        <p:cNvPr id="1" name=""/>
+        <p:cNvGrpSpPr/>
+        <p:nvPr/>
+      </p:nvGrpSpPr>
+      <p:grpSpPr>
+        <a:xfrm>
+          <a:off x="0" y="0"/>
+          <a:ext cx="0" cy="0"/>
+          <a:chOff x="0" y="0"/>
+          <a:chExt cx="0" cy="0"/>
+        </a:xfrm>
+      </p:grpSpPr>
       <p:pic>
         <p:nvPicPr>
           <p:cNvPr id="5" name="Picture 4"/>
@@ -4164,7 +3888,7 @@
         <p:spPr>
           <a:xfrm>
             <a:off x="12" y="1905"/>
-            <a:ext cx="4566916" cy="3425187"/>
+            <a:ext cx="4566917" cy="3425188"/>
           </a:xfrm>
           <a:prstGeom prst="rect">
             <a:avLst/>
@@ -4179,8 +3903,8 @@
         </p:nvSpPr>
         <p:spPr>
           <a:xfrm>
-            <a:off x="1314911" y="6538394"/>
-            <a:ext cx="5731069" cy="369332"/>
+            <a:off x="389618" y="6520251"/>
+            <a:ext cx="8398153" cy="369332"/>
           </a:xfrm>
           <a:prstGeom prst="rect">
             <a:avLst/>
@@ -4195,7 +3919,7 @@
           <a:p>
             <a:r>
               <a:rPr lang="en-US" dirty="0" smtClean="0"/>
-              <a:t>IBM IA64 Dual Processors (NCSA IA64 2008) Total Cores: 32</a:t>
+              <a:t>Sun Constellation Quad Core (TACC Ranger 2008) Node: 8 Cores/Node: 4 Total Cores: 32</a:t>
             </a:r>
             <a:endParaRPr lang="en-US" dirty="0"/>
           </a:p>
@@ -4204,7 +3928,533 @@
     </p:spTree>
     <p:extLst>
       <p:ext uri="{BB962C8B-B14F-4D97-AF65-F5344CB8AC3E}">
-        <p14:creationId xmlns:p14="http://schemas.microsoft.com/office/powerpoint/2010/main" val="904117423"/>
+        <p14:creationId xmlns:p14="http://schemas.microsoft.com/office/powerpoint/2010/main" val="2961089123"/>
+      </p:ext>
+    </p:extLst>
+  </p:cSld>
+  <p:clrMapOvr>
+    <a:masterClrMapping/>
+  </p:clrMapOvr>
+  <p:timing>
+    <p:tnLst>
+      <p:par>
+        <p:cTn xmlns:p14="http://schemas.microsoft.com/office/powerpoint/2010/main" id="1" dur="indefinite" restart="never" nodeType="tmRoot"/>
+      </p:par>
+    </p:tnLst>
+  </p:timing>
+</p:sld>
+</file>
+
+<file path=ppt/slides/slide16.xml><?xml version="1.0" encoding="utf-8"?>
+<p:sld xmlns:a="http://schemas.openxmlformats.org/drawingml/2006/main" xmlns:r="http://schemas.openxmlformats.org/officeDocument/2006/relationships" xmlns:p="http://schemas.openxmlformats.org/presentationml/2006/main">
+  <p:cSld>
+    <p:spTree>
+      <p:nvGrpSpPr>
+        <p:cNvPr id="1" name=""/>
+        <p:cNvGrpSpPr/>
+        <p:nvPr/>
+      </p:nvGrpSpPr>
+      <p:grpSpPr>
+        <a:xfrm>
+          <a:off x="0" y="0"/>
+          <a:ext cx="0" cy="0"/>
+          <a:chOff x="0" y="0"/>
+          <a:chExt cx="0" cy="0"/>
+        </a:xfrm>
+      </p:grpSpPr>
+      <p:sp>
+        <p:nvSpPr>
+          <p:cNvPr id="2" name="Title 1"/>
+          <p:cNvSpPr>
+            <a:spLocks noGrp="1"/>
+          </p:cNvSpPr>
+          <p:nvPr>
+            <p:ph type="title"/>
+          </p:nvPr>
+        </p:nvSpPr>
+        <p:spPr/>
+        <p:txBody>
+          <a:bodyPr>
+            <a:normAutofit/>
+          </a:bodyPr>
+          <a:lstStyle/>
+          <a:p>
+            <a:r>
+              <a:rPr lang="en-US" sz="3200" dirty="0"/>
+              <a:t>Dell Dual Core – Dual Processor (TACC </a:t>
+            </a:r>
+            <a:r>
+              <a:rPr lang="en-US" sz="3200" dirty="0" err="1" smtClean="0"/>
+              <a:t>Lonestar</a:t>
+            </a:r>
+            <a:r>
+              <a:rPr lang="en-US" sz="3200" dirty="0" smtClean="0"/>
+              <a:t>)</a:t>
+            </a:r>
+            <a:endParaRPr lang="en-US" sz="3200" dirty="0"/>
+          </a:p>
+        </p:txBody>
+      </p:sp>
+    </p:spTree>
+    <p:extLst>
+      <p:ext uri="{BB962C8B-B14F-4D97-AF65-F5344CB8AC3E}">
+        <p14:creationId xmlns:p14="http://schemas.microsoft.com/office/powerpoint/2010/main" val="1282798477"/>
+      </p:ext>
+    </p:extLst>
+  </p:cSld>
+  <p:clrMapOvr>
+    <a:masterClrMapping/>
+  </p:clrMapOvr>
+  <p:timing>
+    <p:tnLst>
+      <p:par>
+        <p:cTn xmlns:p14="http://schemas.microsoft.com/office/powerpoint/2010/main" id="1" dur="indefinite" restart="never" nodeType="tmRoot"/>
+      </p:par>
+    </p:tnLst>
+  </p:timing>
+</p:sld>
+</file>
+
+<file path=ppt/slides/slide17.xml><?xml version="1.0" encoding="utf-8"?>
+<p:sld xmlns:a="http://schemas.openxmlformats.org/drawingml/2006/main" xmlns:r="http://schemas.openxmlformats.org/officeDocument/2006/relationships" xmlns:p="http://schemas.openxmlformats.org/presentationml/2006/main">
+  <p:cSld>
+    <p:spTree>
+      <p:nvGrpSpPr>
+        <p:cNvPr id="1" name=""/>
+        <p:cNvGrpSpPr/>
+        <p:nvPr/>
+      </p:nvGrpSpPr>
+      <p:grpSpPr>
+        <a:xfrm>
+          <a:off x="0" y="0"/>
+          <a:ext cx="0" cy="0"/>
+          <a:chOff x="0" y="0"/>
+          <a:chExt cx="0" cy="0"/>
+        </a:xfrm>
+      </p:grpSpPr>
+      <p:pic>
+        <p:nvPicPr>
+          <p:cNvPr id="5" name="Picture 4"/>
+          <p:cNvPicPr>
+            <a:picLocks noChangeAspect="1"/>
+          </p:cNvPicPr>
+          <p:nvPr/>
+        </p:nvPicPr>
+        <p:blipFill>
+          <a:blip r:embed="rId2">
+            <a:extLst>
+              <a:ext uri="{28A0092B-C50C-407E-A947-70E740481C1C}">
+                <a14:useLocalDpi xmlns:a14="http://schemas.microsoft.com/office/drawing/2010/main" val="0"/>
+              </a:ext>
+            </a:extLst>
+          </a:blip>
+          <a:stretch>
+            <a:fillRect/>
+          </a:stretch>
+        </p:blipFill>
+        <p:spPr>
+          <a:xfrm>
+            <a:off x="4588695" y="27133"/>
+            <a:ext cx="4566924" cy="3425193"/>
+          </a:xfrm>
+          <a:prstGeom prst="rect">
+            <a:avLst/>
+          </a:prstGeom>
+        </p:spPr>
+      </p:pic>
+      <p:pic>
+        <p:nvPicPr>
+          <p:cNvPr id="6" name="Picture 5"/>
+          <p:cNvPicPr>
+            <a:picLocks noChangeAspect="1"/>
+          </p:cNvPicPr>
+          <p:nvPr/>
+        </p:nvPicPr>
+        <p:blipFill>
+          <a:blip r:embed="rId3">
+            <a:extLst>
+              <a:ext uri="{28A0092B-C50C-407E-A947-70E740481C1C}">
+                <a14:useLocalDpi xmlns:a14="http://schemas.microsoft.com/office/drawing/2010/main" val="0"/>
+              </a:ext>
+            </a:extLst>
+          </a:blip>
+          <a:stretch>
+            <a:fillRect/>
+          </a:stretch>
+        </p:blipFill>
+        <p:spPr>
+          <a:xfrm>
+            <a:off x="21770" y="3464384"/>
+            <a:ext cx="4566924" cy="3425193"/>
+          </a:xfrm>
+          <a:prstGeom prst="rect">
+            <a:avLst/>
+          </a:prstGeom>
+        </p:spPr>
+      </p:pic>
+      <p:pic>
+        <p:nvPicPr>
+          <p:cNvPr id="7" name="Picture 6"/>
+          <p:cNvPicPr>
+            <a:picLocks noChangeAspect="1"/>
+          </p:cNvPicPr>
+          <p:nvPr/>
+        </p:nvPicPr>
+        <p:blipFill>
+          <a:blip r:embed="rId4">
+            <a:extLst>
+              <a:ext uri="{28A0092B-C50C-407E-A947-70E740481C1C}">
+                <a14:useLocalDpi xmlns:a14="http://schemas.microsoft.com/office/drawing/2010/main" val="0"/>
+              </a:ext>
+            </a:extLst>
+          </a:blip>
+          <a:stretch>
+            <a:fillRect/>
+          </a:stretch>
+        </p:blipFill>
+        <p:spPr>
+          <a:xfrm>
+            <a:off x="4588695" y="3473522"/>
+            <a:ext cx="4554748" cy="3416061"/>
+          </a:xfrm>
+          <a:prstGeom prst="rect">
+            <a:avLst/>
+          </a:prstGeom>
+        </p:spPr>
+      </p:pic>
+      <p:pic>
+        <p:nvPicPr>
+          <p:cNvPr id="10" name="Picture 9"/>
+          <p:cNvPicPr>
+            <a:picLocks noChangeAspect="1"/>
+          </p:cNvPicPr>
+          <p:nvPr/>
+        </p:nvPicPr>
+        <p:blipFill>
+          <a:blip r:embed="rId5">
+            <a:extLst>
+              <a:ext uri="{28A0092B-C50C-407E-A947-70E740481C1C}">
+                <a14:useLocalDpi xmlns:a14="http://schemas.microsoft.com/office/drawing/2010/main" val="0"/>
+              </a:ext>
+            </a:extLst>
+          </a:blip>
+          <a:stretch>
+            <a:fillRect/>
+          </a:stretch>
+        </p:blipFill>
+        <p:spPr>
+          <a:xfrm>
+            <a:off x="12" y="1905"/>
+            <a:ext cx="4566917" cy="3425187"/>
+          </a:xfrm>
+          <a:prstGeom prst="rect">
+            <a:avLst/>
+          </a:prstGeom>
+        </p:spPr>
+      </p:pic>
+      <p:sp>
+        <p:nvSpPr>
+          <p:cNvPr id="11" name="TextBox 10"/>
+          <p:cNvSpPr txBox="1"/>
+          <p:nvPr/>
+        </p:nvSpPr>
+        <p:spPr>
+          <a:xfrm>
+            <a:off x="1314911" y="6538394"/>
+            <a:ext cx="6861674" cy="369332"/>
+          </a:xfrm>
+          <a:prstGeom prst="rect">
+            <a:avLst/>
+          </a:prstGeom>
+          <a:noFill/>
+        </p:spPr>
+        <p:txBody>
+          <a:bodyPr wrap="none" rtlCol="0">
+            <a:spAutoFit/>
+          </a:bodyPr>
+          <a:lstStyle/>
+          <a:p>
+            <a:r>
+              <a:rPr lang="en-US" dirty="0" smtClean="0"/>
+              <a:t>Dell Dual Core – Dual Processor (TACC </a:t>
+            </a:r>
+            <a:r>
+              <a:rPr lang="en-US" dirty="0" err="1" smtClean="0"/>
+              <a:t>Lonestar</a:t>
+            </a:r>
+            <a:r>
+              <a:rPr lang="en-US" dirty="0" smtClean="0"/>
+              <a:t> 2008) Total Cores: 32</a:t>
+            </a:r>
+            <a:endParaRPr lang="en-US" dirty="0"/>
+          </a:p>
+        </p:txBody>
+      </p:sp>
+    </p:spTree>
+    <p:extLst>
+      <p:ext uri="{BB962C8B-B14F-4D97-AF65-F5344CB8AC3E}">
+        <p14:creationId xmlns:p14="http://schemas.microsoft.com/office/powerpoint/2010/main" val="2387364442"/>
+      </p:ext>
+    </p:extLst>
+  </p:cSld>
+  <p:clrMapOvr>
+    <a:masterClrMapping/>
+  </p:clrMapOvr>
+  <p:timing>
+    <p:tnLst>
+      <p:par>
+        <p:cTn xmlns:p14="http://schemas.microsoft.com/office/powerpoint/2010/main" id="1" dur="indefinite" restart="never" nodeType="tmRoot"/>
+      </p:par>
+    </p:tnLst>
+  </p:timing>
+</p:sld>
+</file>
+
+<file path=ppt/slides/slide18.xml><?xml version="1.0" encoding="utf-8"?>
+<p:sld xmlns:a="http://schemas.openxmlformats.org/drawingml/2006/main" xmlns:r="http://schemas.openxmlformats.org/officeDocument/2006/relationships" xmlns:p="http://schemas.openxmlformats.org/presentationml/2006/main">
+  <p:cSld>
+    <p:spTree>
+      <p:nvGrpSpPr>
+        <p:cNvPr id="1" name=""/>
+        <p:cNvGrpSpPr/>
+        <p:nvPr/>
+      </p:nvGrpSpPr>
+      <p:grpSpPr>
+        <a:xfrm>
+          <a:off x="0" y="0"/>
+          <a:ext cx="0" cy="0"/>
+          <a:chOff x="0" y="0"/>
+          <a:chExt cx="0" cy="0"/>
+        </a:xfrm>
+      </p:grpSpPr>
+      <p:sp>
+        <p:nvSpPr>
+          <p:cNvPr id="2" name="Title 1"/>
+          <p:cNvSpPr>
+            <a:spLocks noGrp="1"/>
+          </p:cNvSpPr>
+          <p:nvPr>
+            <p:ph type="title"/>
+          </p:nvPr>
+        </p:nvSpPr>
+        <p:spPr/>
+        <p:txBody>
+          <a:bodyPr>
+            <a:normAutofit/>
+          </a:bodyPr>
+          <a:lstStyle/>
+          <a:p>
+            <a:r>
+              <a:rPr lang="en-US" sz="3200" dirty="0"/>
+              <a:t>Intel 64 Quad Core – Dual </a:t>
+            </a:r>
+            <a:r>
+              <a:rPr lang="en-US" sz="3200" dirty="0" smtClean="0"/>
+              <a:t>Processor (</a:t>
+            </a:r>
+            <a:r>
+              <a:rPr lang="en-US" sz="3200" dirty="0"/>
+              <a:t>NCSA </a:t>
+            </a:r>
+            <a:r>
+              <a:rPr lang="en-US" sz="3200" dirty="0" smtClean="0"/>
+              <a:t>Abe)</a:t>
+            </a:r>
+            <a:endParaRPr lang="en-US" sz="3200" dirty="0"/>
+          </a:p>
+        </p:txBody>
+      </p:sp>
+    </p:spTree>
+    <p:extLst>
+      <p:ext uri="{BB962C8B-B14F-4D97-AF65-F5344CB8AC3E}">
+        <p14:creationId xmlns:p14="http://schemas.microsoft.com/office/powerpoint/2010/main" val="1136073590"/>
+      </p:ext>
+    </p:extLst>
+  </p:cSld>
+  <p:clrMapOvr>
+    <a:masterClrMapping/>
+  </p:clrMapOvr>
+  <p:timing>
+    <p:tnLst>
+      <p:par>
+        <p:cTn xmlns:p14="http://schemas.microsoft.com/office/powerpoint/2010/main" id="1" dur="indefinite" restart="never" nodeType="tmRoot"/>
+      </p:par>
+    </p:tnLst>
+  </p:timing>
+</p:sld>
+</file>
+
+<file path=ppt/slides/slide19.xml><?xml version="1.0" encoding="utf-8"?>
+<p:sld xmlns:a="http://schemas.openxmlformats.org/drawingml/2006/main" xmlns:r="http://schemas.openxmlformats.org/officeDocument/2006/relationships" xmlns:p="http://schemas.openxmlformats.org/presentationml/2006/main">
+  <p:cSld>
+    <p:spTree>
+      <p:nvGrpSpPr>
+        <p:cNvPr id="1" name=""/>
+        <p:cNvGrpSpPr/>
+        <p:nvPr/>
+      </p:nvGrpSpPr>
+      <p:grpSpPr>
+        <a:xfrm>
+          <a:off x="0" y="0"/>
+          <a:ext cx="0" cy="0"/>
+          <a:chOff x="0" y="0"/>
+          <a:chExt cx="0" cy="0"/>
+        </a:xfrm>
+      </p:grpSpPr>
+      <p:pic>
+        <p:nvPicPr>
+          <p:cNvPr id="5" name="Picture 4"/>
+          <p:cNvPicPr>
+            <a:picLocks noChangeAspect="1"/>
+          </p:cNvPicPr>
+          <p:nvPr/>
+        </p:nvPicPr>
+        <p:blipFill>
+          <a:blip r:embed="rId2">
+            <a:extLst>
+              <a:ext uri="{28A0092B-C50C-407E-A947-70E740481C1C}">
+                <a14:useLocalDpi xmlns:a14="http://schemas.microsoft.com/office/drawing/2010/main" val="0"/>
+              </a:ext>
+            </a:extLst>
+          </a:blip>
+          <a:stretch>
+            <a:fillRect/>
+          </a:stretch>
+        </p:blipFill>
+        <p:spPr>
+          <a:xfrm>
+            <a:off x="4588695" y="27133"/>
+            <a:ext cx="4566924" cy="3425193"/>
+          </a:xfrm>
+          <a:prstGeom prst="rect">
+            <a:avLst/>
+          </a:prstGeom>
+        </p:spPr>
+      </p:pic>
+      <p:pic>
+        <p:nvPicPr>
+          <p:cNvPr id="6" name="Picture 5"/>
+          <p:cNvPicPr>
+            <a:picLocks noChangeAspect="1"/>
+          </p:cNvPicPr>
+          <p:nvPr/>
+        </p:nvPicPr>
+        <p:blipFill>
+          <a:blip r:embed="rId3">
+            <a:extLst>
+              <a:ext uri="{28A0092B-C50C-407E-A947-70E740481C1C}">
+                <a14:useLocalDpi xmlns:a14="http://schemas.microsoft.com/office/drawing/2010/main" val="0"/>
+              </a:ext>
+            </a:extLst>
+          </a:blip>
+          <a:stretch>
+            <a:fillRect/>
+          </a:stretch>
+        </p:blipFill>
+        <p:spPr>
+          <a:xfrm>
+            <a:off x="21770" y="3464384"/>
+            <a:ext cx="4566924" cy="3425193"/>
+          </a:xfrm>
+          <a:prstGeom prst="rect">
+            <a:avLst/>
+          </a:prstGeom>
+        </p:spPr>
+      </p:pic>
+      <p:pic>
+        <p:nvPicPr>
+          <p:cNvPr id="7" name="Picture 6"/>
+          <p:cNvPicPr>
+            <a:picLocks noChangeAspect="1"/>
+          </p:cNvPicPr>
+          <p:nvPr/>
+        </p:nvPicPr>
+        <p:blipFill>
+          <a:blip r:embed="rId4">
+            <a:extLst>
+              <a:ext uri="{28A0092B-C50C-407E-A947-70E740481C1C}">
+                <a14:useLocalDpi xmlns:a14="http://schemas.microsoft.com/office/drawing/2010/main" val="0"/>
+              </a:ext>
+            </a:extLst>
+          </a:blip>
+          <a:stretch>
+            <a:fillRect/>
+          </a:stretch>
+        </p:blipFill>
+        <p:spPr>
+          <a:xfrm>
+            <a:off x="4588695" y="3473522"/>
+            <a:ext cx="4554748" cy="3416061"/>
+          </a:xfrm>
+          <a:prstGeom prst="rect">
+            <a:avLst/>
+          </a:prstGeom>
+        </p:spPr>
+      </p:pic>
+      <p:pic>
+        <p:nvPicPr>
+          <p:cNvPr id="10" name="Picture 9"/>
+          <p:cNvPicPr>
+            <a:picLocks noChangeAspect="1"/>
+          </p:cNvPicPr>
+          <p:nvPr/>
+        </p:nvPicPr>
+        <p:blipFill>
+          <a:blip r:embed="rId5">
+            <a:extLst>
+              <a:ext uri="{28A0092B-C50C-407E-A947-70E740481C1C}">
+                <a14:useLocalDpi xmlns:a14="http://schemas.microsoft.com/office/drawing/2010/main" val="0"/>
+              </a:ext>
+            </a:extLst>
+          </a:blip>
+          <a:stretch>
+            <a:fillRect/>
+          </a:stretch>
+        </p:blipFill>
+        <p:spPr>
+          <a:xfrm>
+            <a:off x="12" y="1905"/>
+            <a:ext cx="4566917" cy="3425187"/>
+          </a:xfrm>
+          <a:prstGeom prst="rect">
+            <a:avLst/>
+          </a:prstGeom>
+        </p:spPr>
+      </p:pic>
+      <p:sp>
+        <p:nvSpPr>
+          <p:cNvPr id="11" name="TextBox 10"/>
+          <p:cNvSpPr txBox="1"/>
+          <p:nvPr/>
+        </p:nvSpPr>
+        <p:spPr>
+          <a:xfrm>
+            <a:off x="1314911" y="6538394"/>
+            <a:ext cx="6614949" cy="369332"/>
+          </a:xfrm>
+          <a:prstGeom prst="rect">
+            <a:avLst/>
+          </a:prstGeom>
+          <a:noFill/>
+        </p:spPr>
+        <p:txBody>
+          <a:bodyPr wrap="none" rtlCol="0">
+            <a:spAutoFit/>
+          </a:bodyPr>
+          <a:lstStyle/>
+          <a:p>
+            <a:r>
+              <a:rPr lang="en-US" dirty="0" smtClean="0"/>
+              <a:t>Intel 64 Quad Core – Dual Processor(NCSA Abe 2008) Total Cores: 32</a:t>
+            </a:r>
+            <a:endParaRPr lang="en-US" dirty="0"/>
+          </a:p>
+        </p:txBody>
+      </p:sp>
+    </p:spTree>
+    <p:extLst>
+      <p:ext uri="{BB962C8B-B14F-4D97-AF65-F5344CB8AC3E}">
+        <p14:creationId xmlns:p14="http://schemas.microsoft.com/office/powerpoint/2010/main" val="2851261483"/>
       </p:ext>
     </p:extLst>
   </p:cSld>
@@ -4260,8 +4510,8 @@
         </p:blipFill>
         <p:spPr>
           <a:xfrm>
-            <a:off x="4588695" y="25230"/>
-            <a:ext cx="4566924" cy="3428999"/>
+            <a:off x="4588695" y="27133"/>
+            <a:ext cx="4566924" cy="3425193"/>
           </a:xfrm>
           <a:prstGeom prst="rect">
             <a:avLst/>
@@ -4290,8 +4540,8 @@
         </p:blipFill>
         <p:spPr>
           <a:xfrm>
-            <a:off x="21770" y="3462481"/>
-            <a:ext cx="4566924" cy="3428998"/>
+            <a:off x="21770" y="3464384"/>
+            <a:ext cx="4566924" cy="3425193"/>
           </a:xfrm>
           <a:prstGeom prst="rect">
             <a:avLst/>
@@ -4320,8 +4570,8 @@
         </p:blipFill>
         <p:spPr>
           <a:xfrm>
-            <a:off x="4588696" y="3471625"/>
-            <a:ext cx="4554745" cy="3419855"/>
+            <a:off x="4588695" y="3473522"/>
+            <a:ext cx="4554748" cy="3416061"/>
           </a:xfrm>
           <a:prstGeom prst="rect">
             <a:avLst/>
@@ -4350,8 +4600,8 @@
         </p:blipFill>
         <p:spPr>
           <a:xfrm>
-            <a:off x="12" y="2"/>
-            <a:ext cx="4566918" cy="3428994"/>
+            <a:off x="12" y="1905"/>
+            <a:ext cx="4566916" cy="3425187"/>
           </a:xfrm>
           <a:prstGeom prst="rect">
             <a:avLst/>
@@ -4366,8 +4616,8 @@
         </p:nvSpPr>
         <p:spPr>
           <a:xfrm>
-            <a:off x="1269971" y="6505750"/>
-            <a:ext cx="7485756" cy="369332"/>
+            <a:off x="1314911" y="6538394"/>
+            <a:ext cx="5654876" cy="369332"/>
           </a:xfrm>
           <a:prstGeom prst="rect">
             <a:avLst/>
@@ -4382,23 +4632,7 @@
           <a:p>
             <a:r>
               <a:rPr lang="en-US" dirty="0" smtClean="0"/>
-              <a:t>IBM Blue Gene/Q (ALCF Mira 2014) Nodes: </a:t>
-            </a:r>
-            <a:r>
-              <a:rPr lang="en-US" dirty="0" smtClean="0"/>
-              <a:t>32 </a:t>
-            </a:r>
-            <a:r>
-              <a:rPr lang="en-US" dirty="0" smtClean="0"/>
-              <a:t>Cores/Node: </a:t>
-            </a:r>
-            <a:r>
-              <a:rPr lang="en-US" dirty="0" smtClean="0"/>
-              <a:t>1 </a:t>
-            </a:r>
-            <a:r>
-              <a:rPr lang="en-US" dirty="0" smtClean="0"/>
-              <a:t>Total Cores: 32</a:t>
+              <a:t>IBM IA64 Dual Processors (SDSC IA64 2008) Total Cores: 32</a:t>
             </a:r>
             <a:endParaRPr lang="en-US" dirty="0"/>
           </a:p>
@@ -4407,7 +4641,1558 @@
     </p:spTree>
     <p:extLst>
       <p:ext uri="{BB962C8B-B14F-4D97-AF65-F5344CB8AC3E}">
-        <p14:creationId xmlns:p14="http://schemas.microsoft.com/office/powerpoint/2010/main" val="1031835119"/>
+        <p14:creationId xmlns:p14="http://schemas.microsoft.com/office/powerpoint/2010/main" val="4151978774"/>
+      </p:ext>
+    </p:extLst>
+  </p:cSld>
+  <p:clrMapOvr>
+    <a:masterClrMapping/>
+  </p:clrMapOvr>
+  <p:timing>
+    <p:tnLst>
+      <p:par>
+        <p:cTn xmlns:p14="http://schemas.microsoft.com/office/powerpoint/2010/main" id="1" dur="indefinite" restart="never" nodeType="tmRoot"/>
+      </p:par>
+    </p:tnLst>
+  </p:timing>
+</p:sld>
+</file>
+
+<file path=ppt/slides/slide20.xml><?xml version="1.0" encoding="utf-8"?>
+<p:sld xmlns:a="http://schemas.openxmlformats.org/drawingml/2006/main" xmlns:r="http://schemas.openxmlformats.org/officeDocument/2006/relationships" xmlns:p="http://schemas.openxmlformats.org/presentationml/2006/main">
+  <p:cSld>
+    <p:spTree>
+      <p:nvGrpSpPr>
+        <p:cNvPr id="1" name=""/>
+        <p:cNvGrpSpPr/>
+        <p:nvPr/>
+      </p:nvGrpSpPr>
+      <p:grpSpPr>
+        <a:xfrm>
+          <a:off x="0" y="0"/>
+          <a:ext cx="0" cy="0"/>
+          <a:chOff x="0" y="0"/>
+          <a:chExt cx="0" cy="0"/>
+        </a:xfrm>
+      </p:grpSpPr>
+      <p:sp>
+        <p:nvSpPr>
+          <p:cNvPr id="2" name="Title 1"/>
+          <p:cNvSpPr>
+            <a:spLocks noGrp="1"/>
+          </p:cNvSpPr>
+          <p:nvPr>
+            <p:ph type="title"/>
+          </p:nvPr>
+        </p:nvSpPr>
+        <p:spPr/>
+        <p:txBody>
+          <a:bodyPr>
+            <a:normAutofit/>
+          </a:bodyPr>
+          <a:lstStyle/>
+          <a:p>
+            <a:r>
+              <a:rPr lang="en-US" sz="3600" dirty="0" smtClean="0"/>
+              <a:t>AMD Opteron and XEON (USC HPCC)</a:t>
+            </a:r>
+            <a:endParaRPr lang="en-US" sz="3600" dirty="0"/>
+          </a:p>
+        </p:txBody>
+      </p:sp>
+    </p:spTree>
+    <p:extLst>
+      <p:ext uri="{BB962C8B-B14F-4D97-AF65-F5344CB8AC3E}">
+        <p14:creationId xmlns:p14="http://schemas.microsoft.com/office/powerpoint/2010/main" val="2202998319"/>
+      </p:ext>
+    </p:extLst>
+  </p:cSld>
+  <p:clrMapOvr>
+    <a:masterClrMapping/>
+  </p:clrMapOvr>
+  <p:timing>
+    <p:tnLst>
+      <p:par>
+        <p:cTn xmlns:p14="http://schemas.microsoft.com/office/powerpoint/2010/main" id="1" dur="indefinite" restart="never" nodeType="tmRoot"/>
+      </p:par>
+    </p:tnLst>
+  </p:timing>
+</p:sld>
+</file>
+
+<file path=ppt/slides/slide21.xml><?xml version="1.0" encoding="utf-8"?>
+<p:sld xmlns:a="http://schemas.openxmlformats.org/drawingml/2006/main" xmlns:r="http://schemas.openxmlformats.org/officeDocument/2006/relationships" xmlns:p="http://schemas.openxmlformats.org/presentationml/2006/main">
+  <p:cSld>
+    <p:spTree>
+      <p:nvGrpSpPr>
+        <p:cNvPr id="1" name=""/>
+        <p:cNvGrpSpPr/>
+        <p:nvPr/>
+      </p:nvGrpSpPr>
+      <p:grpSpPr>
+        <a:xfrm>
+          <a:off x="0" y="0"/>
+          <a:ext cx="0" cy="0"/>
+          <a:chOff x="0" y="0"/>
+          <a:chExt cx="0" cy="0"/>
+        </a:xfrm>
+      </p:grpSpPr>
+      <p:pic>
+        <p:nvPicPr>
+          <p:cNvPr id="5" name="Picture 4"/>
+          <p:cNvPicPr>
+            <a:picLocks noChangeAspect="1"/>
+          </p:cNvPicPr>
+          <p:nvPr/>
+        </p:nvPicPr>
+        <p:blipFill>
+          <a:blip r:embed="rId2">
+            <a:extLst>
+              <a:ext uri="{28A0092B-C50C-407E-A947-70E740481C1C}">
+                <a14:useLocalDpi xmlns:a14="http://schemas.microsoft.com/office/drawing/2010/main" val="0"/>
+              </a:ext>
+            </a:extLst>
+          </a:blip>
+          <a:stretch>
+            <a:fillRect/>
+          </a:stretch>
+        </p:blipFill>
+        <p:spPr>
+          <a:xfrm>
+            <a:off x="4591229" y="27133"/>
+            <a:ext cx="4561855" cy="3425193"/>
+          </a:xfrm>
+          <a:prstGeom prst="rect">
+            <a:avLst/>
+          </a:prstGeom>
+        </p:spPr>
+      </p:pic>
+      <p:pic>
+        <p:nvPicPr>
+          <p:cNvPr id="6" name="Picture 5"/>
+          <p:cNvPicPr>
+            <a:picLocks noChangeAspect="1"/>
+          </p:cNvPicPr>
+          <p:nvPr/>
+        </p:nvPicPr>
+        <p:blipFill>
+          <a:blip r:embed="rId3">
+            <a:extLst>
+              <a:ext uri="{28A0092B-C50C-407E-A947-70E740481C1C}">
+                <a14:useLocalDpi xmlns:a14="http://schemas.microsoft.com/office/drawing/2010/main" val="0"/>
+              </a:ext>
+            </a:extLst>
+          </a:blip>
+          <a:stretch>
+            <a:fillRect/>
+          </a:stretch>
+        </p:blipFill>
+        <p:spPr>
+          <a:xfrm>
+            <a:off x="24304" y="3464384"/>
+            <a:ext cx="4561855" cy="3425193"/>
+          </a:xfrm>
+          <a:prstGeom prst="rect">
+            <a:avLst/>
+          </a:prstGeom>
+        </p:spPr>
+      </p:pic>
+      <p:pic>
+        <p:nvPicPr>
+          <p:cNvPr id="7" name="Picture 6"/>
+          <p:cNvPicPr>
+            <a:picLocks noChangeAspect="1"/>
+          </p:cNvPicPr>
+          <p:nvPr/>
+        </p:nvPicPr>
+        <p:blipFill>
+          <a:blip r:embed="rId4">
+            <a:extLst>
+              <a:ext uri="{28A0092B-C50C-407E-A947-70E740481C1C}">
+                <a14:useLocalDpi xmlns:a14="http://schemas.microsoft.com/office/drawing/2010/main" val="0"/>
+              </a:ext>
+            </a:extLst>
+          </a:blip>
+          <a:stretch>
+            <a:fillRect/>
+          </a:stretch>
+        </p:blipFill>
+        <p:spPr>
+          <a:xfrm>
+            <a:off x="4591223" y="3473522"/>
+            <a:ext cx="4549692" cy="3416061"/>
+          </a:xfrm>
+          <a:prstGeom prst="rect">
+            <a:avLst/>
+          </a:prstGeom>
+        </p:spPr>
+      </p:pic>
+      <p:pic>
+        <p:nvPicPr>
+          <p:cNvPr id="10" name="Picture 9"/>
+          <p:cNvPicPr>
+            <a:picLocks noChangeAspect="1"/>
+          </p:cNvPicPr>
+          <p:nvPr/>
+        </p:nvPicPr>
+        <p:blipFill>
+          <a:blip r:embed="rId5">
+            <a:extLst>
+              <a:ext uri="{28A0092B-C50C-407E-A947-70E740481C1C}">
+                <a14:useLocalDpi xmlns:a14="http://schemas.microsoft.com/office/drawing/2010/main" val="0"/>
+              </a:ext>
+            </a:extLst>
+          </a:blip>
+          <a:stretch>
+            <a:fillRect/>
+          </a:stretch>
+        </p:blipFill>
+        <p:spPr>
+          <a:xfrm>
+            <a:off x="2546" y="1905"/>
+            <a:ext cx="4561847" cy="3425187"/>
+          </a:xfrm>
+          <a:prstGeom prst="rect">
+            <a:avLst/>
+          </a:prstGeom>
+        </p:spPr>
+      </p:pic>
+      <p:sp>
+        <p:nvSpPr>
+          <p:cNvPr id="11" name="TextBox 10"/>
+          <p:cNvSpPr txBox="1"/>
+          <p:nvPr/>
+        </p:nvSpPr>
+        <p:spPr>
+          <a:xfrm>
+            <a:off x="24304" y="6488668"/>
+            <a:ext cx="9250925" cy="369332"/>
+          </a:xfrm>
+          <a:prstGeom prst="rect">
+            <a:avLst/>
+          </a:prstGeom>
+          <a:noFill/>
+        </p:spPr>
+        <p:txBody>
+          <a:bodyPr wrap="none" rtlCol="0">
+            <a:spAutoFit/>
+          </a:bodyPr>
+          <a:lstStyle/>
+          <a:p>
+            <a:r>
+              <a:rPr lang="en-US" dirty="0"/>
+              <a:t>Dual </a:t>
+            </a:r>
+            <a:r>
+              <a:rPr lang="en-US" dirty="0" err="1"/>
+              <a:t>Dodecacore</a:t>
+            </a:r>
+            <a:r>
+              <a:rPr lang="en-US" dirty="0"/>
+              <a:t> AMD Opteron (USC </a:t>
+            </a:r>
+            <a:r>
+              <a:rPr lang="en-US" dirty="0" smtClean="0"/>
+              <a:t>HPCC NBNS 2014) Nodes: 32 Cores/Node: 1 Total Cores: 32</a:t>
+            </a:r>
+            <a:endParaRPr lang="en-US" dirty="0"/>
+          </a:p>
+        </p:txBody>
+      </p:sp>
+    </p:spTree>
+    <p:extLst>
+      <p:ext uri="{BB962C8B-B14F-4D97-AF65-F5344CB8AC3E}">
+        <p14:creationId xmlns:p14="http://schemas.microsoft.com/office/powerpoint/2010/main" val="4066902327"/>
+      </p:ext>
+    </p:extLst>
+  </p:cSld>
+  <p:clrMapOvr>
+    <a:masterClrMapping/>
+  </p:clrMapOvr>
+  <p:timing>
+    <p:tnLst>
+      <p:par>
+        <p:cTn xmlns:p14="http://schemas.microsoft.com/office/powerpoint/2010/main" id="1" dur="indefinite" restart="never" nodeType="tmRoot"/>
+      </p:par>
+    </p:tnLst>
+  </p:timing>
+</p:sld>
+</file>
+
+<file path=ppt/slides/slide22.xml><?xml version="1.0" encoding="utf-8"?>
+<p:sld xmlns:a="http://schemas.openxmlformats.org/drawingml/2006/main" xmlns:r="http://schemas.openxmlformats.org/officeDocument/2006/relationships" xmlns:p="http://schemas.openxmlformats.org/presentationml/2006/main">
+  <p:cSld>
+    <p:spTree>
+      <p:nvGrpSpPr>
+        <p:cNvPr id="1" name=""/>
+        <p:cNvGrpSpPr/>
+        <p:nvPr/>
+      </p:nvGrpSpPr>
+      <p:grpSpPr>
+        <a:xfrm>
+          <a:off x="0" y="0"/>
+          <a:ext cx="0" cy="0"/>
+          <a:chOff x="0" y="0"/>
+          <a:chExt cx="0" cy="0"/>
+        </a:xfrm>
+      </p:grpSpPr>
+      <p:pic>
+        <p:nvPicPr>
+          <p:cNvPr id="5" name="Picture 4"/>
+          <p:cNvPicPr>
+            <a:picLocks noChangeAspect="1"/>
+          </p:cNvPicPr>
+          <p:nvPr/>
+        </p:nvPicPr>
+        <p:blipFill>
+          <a:blip r:embed="rId2">
+            <a:extLst>
+              <a:ext uri="{28A0092B-C50C-407E-A947-70E740481C1C}">
+                <a14:useLocalDpi xmlns:a14="http://schemas.microsoft.com/office/drawing/2010/main" val="0"/>
+              </a:ext>
+            </a:extLst>
+          </a:blip>
+          <a:stretch>
+            <a:fillRect/>
+          </a:stretch>
+        </p:blipFill>
+        <p:spPr>
+          <a:xfrm>
+            <a:off x="4591229" y="27133"/>
+            <a:ext cx="4561855" cy="3425192"/>
+          </a:xfrm>
+          <a:prstGeom prst="rect">
+            <a:avLst/>
+          </a:prstGeom>
+        </p:spPr>
+      </p:pic>
+      <p:pic>
+        <p:nvPicPr>
+          <p:cNvPr id="6" name="Picture 5"/>
+          <p:cNvPicPr>
+            <a:picLocks noChangeAspect="1"/>
+          </p:cNvPicPr>
+          <p:nvPr/>
+        </p:nvPicPr>
+        <p:blipFill>
+          <a:blip r:embed="rId3">
+            <a:extLst>
+              <a:ext uri="{28A0092B-C50C-407E-A947-70E740481C1C}">
+                <a14:useLocalDpi xmlns:a14="http://schemas.microsoft.com/office/drawing/2010/main" val="0"/>
+              </a:ext>
+            </a:extLst>
+          </a:blip>
+          <a:stretch>
+            <a:fillRect/>
+          </a:stretch>
+        </p:blipFill>
+        <p:spPr>
+          <a:xfrm>
+            <a:off x="24304" y="3464384"/>
+            <a:ext cx="4561855" cy="3425192"/>
+          </a:xfrm>
+          <a:prstGeom prst="rect">
+            <a:avLst/>
+          </a:prstGeom>
+        </p:spPr>
+      </p:pic>
+      <p:pic>
+        <p:nvPicPr>
+          <p:cNvPr id="7" name="Picture 6"/>
+          <p:cNvPicPr>
+            <a:picLocks noChangeAspect="1"/>
+          </p:cNvPicPr>
+          <p:nvPr/>
+        </p:nvPicPr>
+        <p:blipFill>
+          <a:blip r:embed="rId4">
+            <a:extLst>
+              <a:ext uri="{28A0092B-C50C-407E-A947-70E740481C1C}">
+                <a14:useLocalDpi xmlns:a14="http://schemas.microsoft.com/office/drawing/2010/main" val="0"/>
+              </a:ext>
+            </a:extLst>
+          </a:blip>
+          <a:stretch>
+            <a:fillRect/>
+          </a:stretch>
+        </p:blipFill>
+        <p:spPr>
+          <a:xfrm>
+            <a:off x="4591223" y="3473522"/>
+            <a:ext cx="4549692" cy="3416060"/>
+          </a:xfrm>
+          <a:prstGeom prst="rect">
+            <a:avLst/>
+          </a:prstGeom>
+        </p:spPr>
+      </p:pic>
+      <p:pic>
+        <p:nvPicPr>
+          <p:cNvPr id="10" name="Picture 9"/>
+          <p:cNvPicPr>
+            <a:picLocks noChangeAspect="1"/>
+          </p:cNvPicPr>
+          <p:nvPr/>
+        </p:nvPicPr>
+        <p:blipFill>
+          <a:blip r:embed="rId5">
+            <a:extLst>
+              <a:ext uri="{28A0092B-C50C-407E-A947-70E740481C1C}">
+                <a14:useLocalDpi xmlns:a14="http://schemas.microsoft.com/office/drawing/2010/main" val="0"/>
+              </a:ext>
+            </a:extLst>
+          </a:blip>
+          <a:stretch>
+            <a:fillRect/>
+          </a:stretch>
+        </p:blipFill>
+        <p:spPr>
+          <a:xfrm>
+            <a:off x="2546" y="1905"/>
+            <a:ext cx="4561847" cy="3425186"/>
+          </a:xfrm>
+          <a:prstGeom prst="rect">
+            <a:avLst/>
+          </a:prstGeom>
+        </p:spPr>
+      </p:pic>
+      <p:sp>
+        <p:nvSpPr>
+          <p:cNvPr id="11" name="TextBox 10"/>
+          <p:cNvSpPr txBox="1"/>
+          <p:nvPr/>
+        </p:nvSpPr>
+        <p:spPr>
+          <a:xfrm>
+            <a:off x="24304" y="6488668"/>
+            <a:ext cx="8906254" cy="369332"/>
+          </a:xfrm>
+          <a:prstGeom prst="rect">
+            <a:avLst/>
+          </a:prstGeom>
+          <a:noFill/>
+        </p:spPr>
+        <p:txBody>
+          <a:bodyPr wrap="none" rtlCol="0">
+            <a:spAutoFit/>
+          </a:bodyPr>
+          <a:lstStyle/>
+          <a:p>
+            <a:r>
+              <a:rPr lang="en-US" dirty="0" smtClean="0"/>
+              <a:t>AMD and Dual</a:t>
+            </a:r>
+            <a:r>
+              <a:rPr lang="en-US" dirty="0"/>
+              <a:t> </a:t>
+            </a:r>
+            <a:r>
+              <a:rPr lang="en-US" dirty="0" smtClean="0"/>
+              <a:t>Quad XEON </a:t>
+            </a:r>
+            <a:r>
+              <a:rPr lang="en-US" dirty="0"/>
+              <a:t>(USC </a:t>
+            </a:r>
+            <a:r>
+              <a:rPr lang="en-US" dirty="0" smtClean="0"/>
+              <a:t>HPCC Main 2014 ) Nodes: 32 Cores/Node: 1 Total Cores: 32</a:t>
+            </a:r>
+            <a:endParaRPr lang="en-US" dirty="0"/>
+          </a:p>
+        </p:txBody>
+      </p:sp>
+    </p:spTree>
+    <p:extLst>
+      <p:ext uri="{BB962C8B-B14F-4D97-AF65-F5344CB8AC3E}">
+        <p14:creationId xmlns:p14="http://schemas.microsoft.com/office/powerpoint/2010/main" val="3277169371"/>
+      </p:ext>
+    </p:extLst>
+  </p:cSld>
+  <p:clrMapOvr>
+    <a:masterClrMapping/>
+  </p:clrMapOvr>
+  <p:timing>
+    <p:tnLst>
+      <p:par>
+        <p:cTn xmlns:p14="http://schemas.microsoft.com/office/powerpoint/2010/main" id="1" dur="indefinite" restart="never" nodeType="tmRoot"/>
+      </p:par>
+    </p:tnLst>
+  </p:timing>
+</p:sld>
+</file>
+
+<file path=ppt/slides/slide23.xml><?xml version="1.0" encoding="utf-8"?>
+<p:sld xmlns:a="http://schemas.openxmlformats.org/drawingml/2006/main" xmlns:r="http://schemas.openxmlformats.org/officeDocument/2006/relationships" xmlns:p="http://schemas.openxmlformats.org/presentationml/2006/main">
+  <p:cSld>
+    <p:spTree>
+      <p:nvGrpSpPr>
+        <p:cNvPr id="1" name=""/>
+        <p:cNvGrpSpPr/>
+        <p:nvPr/>
+      </p:nvGrpSpPr>
+      <p:grpSpPr>
+        <a:xfrm>
+          <a:off x="0" y="0"/>
+          <a:ext cx="0" cy="0"/>
+          <a:chOff x="0" y="0"/>
+          <a:chExt cx="0" cy="0"/>
+        </a:xfrm>
+      </p:grpSpPr>
+      <p:pic>
+        <p:nvPicPr>
+          <p:cNvPr id="5" name="Picture 4"/>
+          <p:cNvPicPr>
+            <a:picLocks noChangeAspect="1"/>
+          </p:cNvPicPr>
+          <p:nvPr/>
+        </p:nvPicPr>
+        <p:blipFill>
+          <a:blip r:embed="rId2">
+            <a:extLst>
+              <a:ext uri="{28A0092B-C50C-407E-A947-70E740481C1C}">
+                <a14:useLocalDpi xmlns:a14="http://schemas.microsoft.com/office/drawing/2010/main" val="0"/>
+              </a:ext>
+            </a:extLst>
+          </a:blip>
+          <a:stretch>
+            <a:fillRect/>
+          </a:stretch>
+        </p:blipFill>
+        <p:spPr>
+          <a:xfrm>
+            <a:off x="4591230" y="27133"/>
+            <a:ext cx="4561853" cy="3425192"/>
+          </a:xfrm>
+          <a:prstGeom prst="rect">
+            <a:avLst/>
+          </a:prstGeom>
+        </p:spPr>
+      </p:pic>
+      <p:pic>
+        <p:nvPicPr>
+          <p:cNvPr id="6" name="Picture 5"/>
+          <p:cNvPicPr>
+            <a:picLocks noChangeAspect="1"/>
+          </p:cNvPicPr>
+          <p:nvPr/>
+        </p:nvPicPr>
+        <p:blipFill>
+          <a:blip r:embed="rId3">
+            <a:extLst>
+              <a:ext uri="{28A0092B-C50C-407E-A947-70E740481C1C}">
+                <a14:useLocalDpi xmlns:a14="http://schemas.microsoft.com/office/drawing/2010/main" val="0"/>
+              </a:ext>
+            </a:extLst>
+          </a:blip>
+          <a:stretch>
+            <a:fillRect/>
+          </a:stretch>
+        </p:blipFill>
+        <p:spPr>
+          <a:xfrm>
+            <a:off x="24305" y="3464384"/>
+            <a:ext cx="4561853" cy="3425192"/>
+          </a:xfrm>
+          <a:prstGeom prst="rect">
+            <a:avLst/>
+          </a:prstGeom>
+        </p:spPr>
+      </p:pic>
+      <p:pic>
+        <p:nvPicPr>
+          <p:cNvPr id="7" name="Picture 6"/>
+          <p:cNvPicPr>
+            <a:picLocks noChangeAspect="1"/>
+          </p:cNvPicPr>
+          <p:nvPr/>
+        </p:nvPicPr>
+        <p:blipFill>
+          <a:blip r:embed="rId4">
+            <a:extLst>
+              <a:ext uri="{28A0092B-C50C-407E-A947-70E740481C1C}">
+                <a14:useLocalDpi xmlns:a14="http://schemas.microsoft.com/office/drawing/2010/main" val="0"/>
+              </a:ext>
+            </a:extLst>
+          </a:blip>
+          <a:stretch>
+            <a:fillRect/>
+          </a:stretch>
+        </p:blipFill>
+        <p:spPr>
+          <a:xfrm>
+            <a:off x="4591223" y="3473522"/>
+            <a:ext cx="4549691" cy="3416060"/>
+          </a:xfrm>
+          <a:prstGeom prst="rect">
+            <a:avLst/>
+          </a:prstGeom>
+        </p:spPr>
+      </p:pic>
+      <p:pic>
+        <p:nvPicPr>
+          <p:cNvPr id="10" name="Picture 9"/>
+          <p:cNvPicPr>
+            <a:picLocks noChangeAspect="1"/>
+          </p:cNvPicPr>
+          <p:nvPr/>
+        </p:nvPicPr>
+        <p:blipFill>
+          <a:blip r:embed="rId5">
+            <a:extLst>
+              <a:ext uri="{28A0092B-C50C-407E-A947-70E740481C1C}">
+                <a14:useLocalDpi xmlns:a14="http://schemas.microsoft.com/office/drawing/2010/main" val="0"/>
+              </a:ext>
+            </a:extLst>
+          </a:blip>
+          <a:stretch>
+            <a:fillRect/>
+          </a:stretch>
+        </p:blipFill>
+        <p:spPr>
+          <a:xfrm>
+            <a:off x="2547" y="1905"/>
+            <a:ext cx="4561845" cy="3425186"/>
+          </a:xfrm>
+          <a:prstGeom prst="rect">
+            <a:avLst/>
+          </a:prstGeom>
+        </p:spPr>
+      </p:pic>
+      <p:sp>
+        <p:nvSpPr>
+          <p:cNvPr id="11" name="TextBox 10"/>
+          <p:cNvSpPr txBox="1"/>
+          <p:nvPr/>
+        </p:nvSpPr>
+        <p:spPr>
+          <a:xfrm>
+            <a:off x="24304" y="6488668"/>
+            <a:ext cx="7868297" cy="369332"/>
+          </a:xfrm>
+          <a:prstGeom prst="rect">
+            <a:avLst/>
+          </a:prstGeom>
+          <a:noFill/>
+        </p:spPr>
+        <p:txBody>
+          <a:bodyPr wrap="none" rtlCol="0">
+            <a:spAutoFit/>
+          </a:bodyPr>
+          <a:lstStyle/>
+          <a:p>
+            <a:r>
+              <a:rPr lang="en-US" dirty="0" smtClean="0"/>
+              <a:t>AMD Opteron </a:t>
+            </a:r>
+            <a:r>
+              <a:rPr lang="en-US" dirty="0"/>
+              <a:t>(USC </a:t>
+            </a:r>
+            <a:r>
+              <a:rPr lang="en-US" dirty="0" smtClean="0"/>
+              <a:t>HPCC </a:t>
+            </a:r>
+            <a:r>
+              <a:rPr lang="en-US" dirty="0" err="1" smtClean="0"/>
+              <a:t>Myrinet</a:t>
+            </a:r>
+            <a:r>
+              <a:rPr lang="en-US" dirty="0" smtClean="0"/>
+              <a:t> 2014 ) Nodes: 32 Cores/Node: 1 Total Cores: 32</a:t>
+            </a:r>
+            <a:endParaRPr lang="en-US" dirty="0"/>
+          </a:p>
+        </p:txBody>
+      </p:sp>
+    </p:spTree>
+    <p:extLst>
+      <p:ext uri="{BB962C8B-B14F-4D97-AF65-F5344CB8AC3E}">
+        <p14:creationId xmlns:p14="http://schemas.microsoft.com/office/powerpoint/2010/main" val="460773318"/>
+      </p:ext>
+    </p:extLst>
+  </p:cSld>
+  <p:clrMapOvr>
+    <a:masterClrMapping/>
+  </p:clrMapOvr>
+  <p:timing>
+    <p:tnLst>
+      <p:par>
+        <p:cTn xmlns:p14="http://schemas.microsoft.com/office/powerpoint/2010/main" id="1" dur="indefinite" restart="never" nodeType="tmRoot"/>
+      </p:par>
+    </p:tnLst>
+  </p:timing>
+</p:sld>
+</file>
+
+<file path=ppt/slides/slide24.xml><?xml version="1.0" encoding="utf-8"?>
+<p:sld xmlns:a="http://schemas.openxmlformats.org/drawingml/2006/main" xmlns:r="http://schemas.openxmlformats.org/officeDocument/2006/relationships" xmlns:p="http://schemas.openxmlformats.org/presentationml/2006/main">
+  <p:cSld>
+    <p:spTree>
+      <p:nvGrpSpPr>
+        <p:cNvPr id="1" name=""/>
+        <p:cNvGrpSpPr/>
+        <p:nvPr/>
+      </p:nvGrpSpPr>
+      <p:grpSpPr>
+        <a:xfrm>
+          <a:off x="0" y="0"/>
+          <a:ext cx="0" cy="0"/>
+          <a:chOff x="0" y="0"/>
+          <a:chExt cx="0" cy="0"/>
+        </a:xfrm>
+      </p:grpSpPr>
+      <p:sp>
+        <p:nvSpPr>
+          <p:cNvPr id="2" name="Title 1"/>
+          <p:cNvSpPr>
+            <a:spLocks noGrp="1"/>
+          </p:cNvSpPr>
+          <p:nvPr>
+            <p:ph type="title"/>
+          </p:nvPr>
+        </p:nvSpPr>
+        <p:spPr/>
+        <p:txBody>
+          <a:bodyPr/>
+          <a:lstStyle/>
+          <a:p>
+            <a:r>
+              <a:rPr lang="en-US" dirty="0" smtClean="0"/>
+              <a:t>Cray XT5</a:t>
+            </a:r>
+            <a:r>
+              <a:rPr lang="en-US" dirty="0"/>
+              <a:t> </a:t>
+            </a:r>
+            <a:r>
+              <a:rPr lang="en-US" dirty="0" smtClean="0"/>
+              <a:t>(NICS Kraken)</a:t>
+            </a:r>
+            <a:endParaRPr lang="en-US" dirty="0"/>
+          </a:p>
+        </p:txBody>
+      </p:sp>
+    </p:spTree>
+    <p:extLst>
+      <p:ext uri="{BB962C8B-B14F-4D97-AF65-F5344CB8AC3E}">
+        <p14:creationId xmlns:p14="http://schemas.microsoft.com/office/powerpoint/2010/main" val="3397327371"/>
+      </p:ext>
+    </p:extLst>
+  </p:cSld>
+  <p:clrMapOvr>
+    <a:masterClrMapping/>
+  </p:clrMapOvr>
+  <p:timing>
+    <p:tnLst>
+      <p:par>
+        <p:cTn xmlns:p14="http://schemas.microsoft.com/office/powerpoint/2010/main" id="1" dur="indefinite" restart="never" nodeType="tmRoot"/>
+      </p:par>
+    </p:tnLst>
+  </p:timing>
+</p:sld>
+</file>
+
+<file path=ppt/slides/slide25.xml><?xml version="1.0" encoding="utf-8"?>
+<p:sld xmlns:a="http://schemas.openxmlformats.org/drawingml/2006/main" xmlns:r="http://schemas.openxmlformats.org/officeDocument/2006/relationships" xmlns:p="http://schemas.openxmlformats.org/presentationml/2006/main">
+  <p:cSld>
+    <p:spTree>
+      <p:nvGrpSpPr>
+        <p:cNvPr id="1" name=""/>
+        <p:cNvGrpSpPr/>
+        <p:nvPr/>
+      </p:nvGrpSpPr>
+      <p:grpSpPr>
+        <a:xfrm>
+          <a:off x="0" y="0"/>
+          <a:ext cx="0" cy="0"/>
+          <a:chOff x="0" y="0"/>
+          <a:chExt cx="0" cy="0"/>
+        </a:xfrm>
+      </p:grpSpPr>
+      <p:pic>
+        <p:nvPicPr>
+          <p:cNvPr id="5" name="Picture 4"/>
+          <p:cNvPicPr>
+            <a:picLocks noChangeAspect="1"/>
+          </p:cNvPicPr>
+          <p:nvPr/>
+        </p:nvPicPr>
+        <p:blipFill>
+          <a:blip r:embed="rId2">
+            <a:extLst>
+              <a:ext uri="{28A0092B-C50C-407E-A947-70E740481C1C}">
+                <a14:useLocalDpi xmlns:a14="http://schemas.microsoft.com/office/drawing/2010/main" val="0"/>
+              </a:ext>
+            </a:extLst>
+          </a:blip>
+          <a:stretch>
+            <a:fillRect/>
+          </a:stretch>
+        </p:blipFill>
+        <p:spPr>
+          <a:xfrm>
+            <a:off x="4588695" y="25230"/>
+            <a:ext cx="4566924" cy="3428999"/>
+          </a:xfrm>
+          <a:prstGeom prst="rect">
+            <a:avLst/>
+          </a:prstGeom>
+        </p:spPr>
+      </p:pic>
+      <p:pic>
+        <p:nvPicPr>
+          <p:cNvPr id="6" name="Picture 5"/>
+          <p:cNvPicPr>
+            <a:picLocks noChangeAspect="1"/>
+          </p:cNvPicPr>
+          <p:nvPr/>
+        </p:nvPicPr>
+        <p:blipFill>
+          <a:blip r:embed="rId3">
+            <a:extLst>
+              <a:ext uri="{28A0092B-C50C-407E-A947-70E740481C1C}">
+                <a14:useLocalDpi xmlns:a14="http://schemas.microsoft.com/office/drawing/2010/main" val="0"/>
+              </a:ext>
+            </a:extLst>
+          </a:blip>
+          <a:stretch>
+            <a:fillRect/>
+          </a:stretch>
+        </p:blipFill>
+        <p:spPr>
+          <a:xfrm>
+            <a:off x="21771" y="3462481"/>
+            <a:ext cx="4566922" cy="3428998"/>
+          </a:xfrm>
+          <a:prstGeom prst="rect">
+            <a:avLst/>
+          </a:prstGeom>
+        </p:spPr>
+      </p:pic>
+      <p:pic>
+        <p:nvPicPr>
+          <p:cNvPr id="7" name="Picture 6"/>
+          <p:cNvPicPr>
+            <a:picLocks noChangeAspect="1"/>
+          </p:cNvPicPr>
+          <p:nvPr/>
+        </p:nvPicPr>
+        <p:blipFill>
+          <a:blip r:embed="rId4">
+            <a:extLst>
+              <a:ext uri="{28A0092B-C50C-407E-A947-70E740481C1C}">
+                <a14:useLocalDpi xmlns:a14="http://schemas.microsoft.com/office/drawing/2010/main" val="0"/>
+              </a:ext>
+            </a:extLst>
+          </a:blip>
+          <a:stretch>
+            <a:fillRect/>
+          </a:stretch>
+        </p:blipFill>
+        <p:spPr>
+          <a:xfrm>
+            <a:off x="4588696" y="3471625"/>
+            <a:ext cx="4554745" cy="3419855"/>
+          </a:xfrm>
+          <a:prstGeom prst="rect">
+            <a:avLst/>
+          </a:prstGeom>
+        </p:spPr>
+      </p:pic>
+      <p:pic>
+        <p:nvPicPr>
+          <p:cNvPr id="10" name="Picture 9"/>
+          <p:cNvPicPr>
+            <a:picLocks noChangeAspect="1"/>
+          </p:cNvPicPr>
+          <p:nvPr/>
+        </p:nvPicPr>
+        <p:blipFill>
+          <a:blip r:embed="rId5">
+            <a:extLst>
+              <a:ext uri="{28A0092B-C50C-407E-A947-70E740481C1C}">
+                <a14:useLocalDpi xmlns:a14="http://schemas.microsoft.com/office/drawing/2010/main" val="0"/>
+              </a:ext>
+            </a:extLst>
+          </a:blip>
+          <a:stretch>
+            <a:fillRect/>
+          </a:stretch>
+        </p:blipFill>
+        <p:spPr>
+          <a:xfrm>
+            <a:off x="12" y="2"/>
+            <a:ext cx="4566918" cy="3428994"/>
+          </a:xfrm>
+          <a:prstGeom prst="rect">
+            <a:avLst/>
+          </a:prstGeom>
+        </p:spPr>
+      </p:pic>
+      <p:sp>
+        <p:nvSpPr>
+          <p:cNvPr id="11" name="TextBox 10"/>
+          <p:cNvSpPr txBox="1"/>
+          <p:nvPr/>
+        </p:nvSpPr>
+        <p:spPr>
+          <a:xfrm>
+            <a:off x="1269971" y="6505750"/>
+            <a:ext cx="6839245" cy="369332"/>
+          </a:xfrm>
+          <a:prstGeom prst="rect">
+            <a:avLst/>
+          </a:prstGeom>
+          <a:noFill/>
+        </p:spPr>
+        <p:txBody>
+          <a:bodyPr wrap="none" rtlCol="0">
+            <a:spAutoFit/>
+          </a:bodyPr>
+          <a:lstStyle/>
+          <a:p>
+            <a:r>
+              <a:rPr lang="en-US" dirty="0"/>
+              <a:t>Cray XT5 (NICS </a:t>
+            </a:r>
+            <a:r>
+              <a:rPr lang="en-US" dirty="0" smtClean="0"/>
+              <a:t>Kraken 2014) Nodes: 32 Cores/Node: 1 Total Cores: 32</a:t>
+            </a:r>
+            <a:endParaRPr lang="en-US" dirty="0"/>
+          </a:p>
+        </p:txBody>
+      </p:sp>
+    </p:spTree>
+    <p:extLst>
+      <p:ext uri="{BB962C8B-B14F-4D97-AF65-F5344CB8AC3E}">
+        <p14:creationId xmlns:p14="http://schemas.microsoft.com/office/powerpoint/2010/main" val="4219871773"/>
+      </p:ext>
+    </p:extLst>
+  </p:cSld>
+  <p:clrMapOvr>
+    <a:masterClrMapping/>
+  </p:clrMapOvr>
+  <p:timing>
+    <p:tnLst>
+      <p:par>
+        <p:cTn xmlns:p14="http://schemas.microsoft.com/office/powerpoint/2010/main" id="1" dur="indefinite" restart="never" nodeType="tmRoot"/>
+      </p:par>
+    </p:tnLst>
+  </p:timing>
+</p:sld>
+</file>
+
+<file path=ppt/slides/slide26.xml><?xml version="1.0" encoding="utf-8"?>
+<p:sld xmlns:a="http://schemas.openxmlformats.org/drawingml/2006/main" xmlns:r="http://schemas.openxmlformats.org/officeDocument/2006/relationships" xmlns:p="http://schemas.openxmlformats.org/presentationml/2006/main">
+  <p:cSld>
+    <p:spTree>
+      <p:nvGrpSpPr>
+        <p:cNvPr id="1" name=""/>
+        <p:cNvGrpSpPr/>
+        <p:nvPr/>
+      </p:nvGrpSpPr>
+      <p:grpSpPr>
+        <a:xfrm>
+          <a:off x="0" y="0"/>
+          <a:ext cx="0" cy="0"/>
+          <a:chOff x="0" y="0"/>
+          <a:chExt cx="0" cy="0"/>
+        </a:xfrm>
+      </p:grpSpPr>
+      <p:pic>
+        <p:nvPicPr>
+          <p:cNvPr id="5" name="Picture 4"/>
+          <p:cNvPicPr>
+            <a:picLocks noChangeAspect="1"/>
+          </p:cNvPicPr>
+          <p:nvPr/>
+        </p:nvPicPr>
+        <p:blipFill>
+          <a:blip r:embed="rId2">
+            <a:extLst>
+              <a:ext uri="{28A0092B-C50C-407E-A947-70E740481C1C}">
+                <a14:useLocalDpi xmlns:a14="http://schemas.microsoft.com/office/drawing/2010/main" val="0"/>
+              </a:ext>
+            </a:extLst>
+          </a:blip>
+          <a:stretch>
+            <a:fillRect/>
+          </a:stretch>
+        </p:blipFill>
+        <p:spPr>
+          <a:xfrm>
+            <a:off x="4588695" y="25230"/>
+            <a:ext cx="4566924" cy="3428999"/>
+          </a:xfrm>
+          <a:prstGeom prst="rect">
+            <a:avLst/>
+          </a:prstGeom>
+        </p:spPr>
+      </p:pic>
+      <p:pic>
+        <p:nvPicPr>
+          <p:cNvPr id="6" name="Picture 5"/>
+          <p:cNvPicPr>
+            <a:picLocks noChangeAspect="1"/>
+          </p:cNvPicPr>
+          <p:nvPr/>
+        </p:nvPicPr>
+        <p:blipFill>
+          <a:blip r:embed="rId3">
+            <a:extLst>
+              <a:ext uri="{28A0092B-C50C-407E-A947-70E740481C1C}">
+                <a14:useLocalDpi xmlns:a14="http://schemas.microsoft.com/office/drawing/2010/main" val="0"/>
+              </a:ext>
+            </a:extLst>
+          </a:blip>
+          <a:stretch>
+            <a:fillRect/>
+          </a:stretch>
+        </p:blipFill>
+        <p:spPr>
+          <a:xfrm>
+            <a:off x="21770" y="3462481"/>
+            <a:ext cx="4566924" cy="3428998"/>
+          </a:xfrm>
+          <a:prstGeom prst="rect">
+            <a:avLst/>
+          </a:prstGeom>
+        </p:spPr>
+      </p:pic>
+      <p:pic>
+        <p:nvPicPr>
+          <p:cNvPr id="7" name="Picture 6"/>
+          <p:cNvPicPr>
+            <a:picLocks noChangeAspect="1"/>
+          </p:cNvPicPr>
+          <p:nvPr/>
+        </p:nvPicPr>
+        <p:blipFill>
+          <a:blip r:embed="rId4">
+            <a:extLst>
+              <a:ext uri="{28A0092B-C50C-407E-A947-70E740481C1C}">
+                <a14:useLocalDpi xmlns:a14="http://schemas.microsoft.com/office/drawing/2010/main" val="0"/>
+              </a:ext>
+            </a:extLst>
+          </a:blip>
+          <a:stretch>
+            <a:fillRect/>
+          </a:stretch>
+        </p:blipFill>
+        <p:spPr>
+          <a:xfrm>
+            <a:off x="4588696" y="3471625"/>
+            <a:ext cx="4554745" cy="3419855"/>
+          </a:xfrm>
+          <a:prstGeom prst="rect">
+            <a:avLst/>
+          </a:prstGeom>
+        </p:spPr>
+      </p:pic>
+      <p:pic>
+        <p:nvPicPr>
+          <p:cNvPr id="10" name="Picture 9"/>
+          <p:cNvPicPr>
+            <a:picLocks noChangeAspect="1"/>
+          </p:cNvPicPr>
+          <p:nvPr/>
+        </p:nvPicPr>
+        <p:blipFill>
+          <a:blip r:embed="rId5">
+            <a:extLst>
+              <a:ext uri="{28A0092B-C50C-407E-A947-70E740481C1C}">
+                <a14:useLocalDpi xmlns:a14="http://schemas.microsoft.com/office/drawing/2010/main" val="0"/>
+              </a:ext>
+            </a:extLst>
+          </a:blip>
+          <a:stretch>
+            <a:fillRect/>
+          </a:stretch>
+        </p:blipFill>
+        <p:spPr>
+          <a:xfrm>
+            <a:off x="12" y="2"/>
+            <a:ext cx="4566918" cy="3428994"/>
+          </a:xfrm>
+          <a:prstGeom prst="rect">
+            <a:avLst/>
+          </a:prstGeom>
+        </p:spPr>
+      </p:pic>
+      <p:sp>
+        <p:nvSpPr>
+          <p:cNvPr id="11" name="TextBox 10"/>
+          <p:cNvSpPr txBox="1"/>
+          <p:nvPr/>
+        </p:nvSpPr>
+        <p:spPr>
+          <a:xfrm>
+            <a:off x="1269971" y="6505750"/>
+            <a:ext cx="6839245" cy="369332"/>
+          </a:xfrm>
+          <a:prstGeom prst="rect">
+            <a:avLst/>
+          </a:prstGeom>
+          <a:noFill/>
+        </p:spPr>
+        <p:txBody>
+          <a:bodyPr wrap="none" rtlCol="0">
+            <a:spAutoFit/>
+          </a:bodyPr>
+          <a:lstStyle/>
+          <a:p>
+            <a:r>
+              <a:rPr lang="en-US" dirty="0"/>
+              <a:t>Cray XT5 (NICS </a:t>
+            </a:r>
+            <a:r>
+              <a:rPr lang="en-US" dirty="0" smtClean="0"/>
+              <a:t>Kraken 2014) Nodes: 3 Cores/Node: 12 Total Cores: 32</a:t>
+            </a:r>
+            <a:endParaRPr lang="en-US" dirty="0"/>
+          </a:p>
+        </p:txBody>
+      </p:sp>
+    </p:spTree>
+    <p:extLst>
+      <p:ext uri="{BB962C8B-B14F-4D97-AF65-F5344CB8AC3E}">
+        <p14:creationId xmlns:p14="http://schemas.microsoft.com/office/powerpoint/2010/main" val="639600072"/>
+      </p:ext>
+    </p:extLst>
+  </p:cSld>
+  <p:clrMapOvr>
+    <a:masterClrMapping/>
+  </p:clrMapOvr>
+  <p:timing>
+    <p:tnLst>
+      <p:par>
+        <p:cTn xmlns:p14="http://schemas.microsoft.com/office/powerpoint/2010/main" id="1" dur="indefinite" restart="never" nodeType="tmRoot"/>
+      </p:par>
+    </p:tnLst>
+  </p:timing>
+</p:sld>
+</file>
+
+<file path=ppt/slides/slide27.xml><?xml version="1.0" encoding="utf-8"?>
+<p:sld xmlns:a="http://schemas.openxmlformats.org/drawingml/2006/main" xmlns:r="http://schemas.openxmlformats.org/officeDocument/2006/relationships" xmlns:p="http://schemas.openxmlformats.org/presentationml/2006/main">
+  <p:cSld>
+    <p:spTree>
+      <p:nvGrpSpPr>
+        <p:cNvPr id="1" name=""/>
+        <p:cNvGrpSpPr/>
+        <p:nvPr/>
+      </p:nvGrpSpPr>
+      <p:grpSpPr>
+        <a:xfrm>
+          <a:off x="0" y="0"/>
+          <a:ext cx="0" cy="0"/>
+          <a:chOff x="0" y="0"/>
+          <a:chExt cx="0" cy="0"/>
+        </a:xfrm>
+      </p:grpSpPr>
+      <p:sp>
+        <p:nvSpPr>
+          <p:cNvPr id="2" name="Title 1"/>
+          <p:cNvSpPr>
+            <a:spLocks noGrp="1"/>
+          </p:cNvSpPr>
+          <p:nvPr>
+            <p:ph type="title"/>
+          </p:nvPr>
+        </p:nvSpPr>
+        <p:spPr/>
+        <p:txBody>
+          <a:bodyPr/>
+          <a:lstStyle/>
+          <a:p>
+            <a:r>
+              <a:rPr lang="en-US" dirty="0" smtClean="0"/>
+              <a:t>IBM Blue Gene/Q	(ALCF Mira)</a:t>
+            </a:r>
+            <a:endParaRPr lang="en-US" dirty="0"/>
+          </a:p>
+        </p:txBody>
+      </p:sp>
+    </p:spTree>
+    <p:extLst>
+      <p:ext uri="{BB962C8B-B14F-4D97-AF65-F5344CB8AC3E}">
+        <p14:creationId xmlns:p14="http://schemas.microsoft.com/office/powerpoint/2010/main" val="2960573853"/>
+      </p:ext>
+    </p:extLst>
+  </p:cSld>
+  <p:clrMapOvr>
+    <a:masterClrMapping/>
+  </p:clrMapOvr>
+  <p:timing>
+    <p:tnLst>
+      <p:par>
+        <p:cTn xmlns:p14="http://schemas.microsoft.com/office/powerpoint/2010/main" id="1" dur="indefinite" restart="never" nodeType="tmRoot"/>
+      </p:par>
+    </p:tnLst>
+  </p:timing>
+</p:sld>
+</file>
+
+<file path=ppt/slides/slide28.xml><?xml version="1.0" encoding="utf-8"?>
+<p:sld xmlns:a="http://schemas.openxmlformats.org/drawingml/2006/main" xmlns:r="http://schemas.openxmlformats.org/officeDocument/2006/relationships" xmlns:p="http://schemas.openxmlformats.org/presentationml/2006/main">
+  <p:cSld>
+    <p:spTree>
+      <p:nvGrpSpPr>
+        <p:cNvPr id="1" name=""/>
+        <p:cNvGrpSpPr/>
+        <p:nvPr/>
+      </p:nvGrpSpPr>
+      <p:grpSpPr>
+        <a:xfrm>
+          <a:off x="0" y="0"/>
+          <a:ext cx="0" cy="0"/>
+          <a:chOff x="0" y="0"/>
+          <a:chExt cx="0" cy="0"/>
+        </a:xfrm>
+      </p:grpSpPr>
+      <p:pic>
+        <p:nvPicPr>
+          <p:cNvPr id="5" name="Picture 4"/>
+          <p:cNvPicPr>
+            <a:picLocks noChangeAspect="1"/>
+          </p:cNvPicPr>
+          <p:nvPr/>
+        </p:nvPicPr>
+        <p:blipFill>
+          <a:blip r:embed="rId2">
+            <a:extLst>
+              <a:ext uri="{28A0092B-C50C-407E-A947-70E740481C1C}">
+                <a14:useLocalDpi xmlns:a14="http://schemas.microsoft.com/office/drawing/2010/main" val="0"/>
+              </a:ext>
+            </a:extLst>
+          </a:blip>
+          <a:stretch>
+            <a:fillRect/>
+          </a:stretch>
+        </p:blipFill>
+        <p:spPr>
+          <a:xfrm>
+            <a:off x="4588695" y="25230"/>
+            <a:ext cx="4566924" cy="3428999"/>
+          </a:xfrm>
+          <a:prstGeom prst="rect">
+            <a:avLst/>
+          </a:prstGeom>
+        </p:spPr>
+      </p:pic>
+      <p:pic>
+        <p:nvPicPr>
+          <p:cNvPr id="6" name="Picture 5"/>
+          <p:cNvPicPr>
+            <a:picLocks noChangeAspect="1"/>
+          </p:cNvPicPr>
+          <p:nvPr/>
+        </p:nvPicPr>
+        <p:blipFill>
+          <a:blip r:embed="rId3">
+            <a:extLst>
+              <a:ext uri="{28A0092B-C50C-407E-A947-70E740481C1C}">
+                <a14:useLocalDpi xmlns:a14="http://schemas.microsoft.com/office/drawing/2010/main" val="0"/>
+              </a:ext>
+            </a:extLst>
+          </a:blip>
+          <a:stretch>
+            <a:fillRect/>
+          </a:stretch>
+        </p:blipFill>
+        <p:spPr>
+          <a:xfrm>
+            <a:off x="21770" y="3462481"/>
+            <a:ext cx="4566924" cy="3428998"/>
+          </a:xfrm>
+          <a:prstGeom prst="rect">
+            <a:avLst/>
+          </a:prstGeom>
+        </p:spPr>
+      </p:pic>
+      <p:pic>
+        <p:nvPicPr>
+          <p:cNvPr id="7" name="Picture 6"/>
+          <p:cNvPicPr>
+            <a:picLocks noChangeAspect="1"/>
+          </p:cNvPicPr>
+          <p:nvPr/>
+        </p:nvPicPr>
+        <p:blipFill>
+          <a:blip r:embed="rId4">
+            <a:extLst>
+              <a:ext uri="{28A0092B-C50C-407E-A947-70E740481C1C}">
+                <a14:useLocalDpi xmlns:a14="http://schemas.microsoft.com/office/drawing/2010/main" val="0"/>
+              </a:ext>
+            </a:extLst>
+          </a:blip>
+          <a:stretch>
+            <a:fillRect/>
+          </a:stretch>
+        </p:blipFill>
+        <p:spPr>
+          <a:xfrm>
+            <a:off x="4588696" y="3471625"/>
+            <a:ext cx="4554745" cy="3419855"/>
+          </a:xfrm>
+          <a:prstGeom prst="rect">
+            <a:avLst/>
+          </a:prstGeom>
+        </p:spPr>
+      </p:pic>
+      <p:pic>
+        <p:nvPicPr>
+          <p:cNvPr id="10" name="Picture 9"/>
+          <p:cNvPicPr>
+            <a:picLocks noChangeAspect="1"/>
+          </p:cNvPicPr>
+          <p:nvPr/>
+        </p:nvPicPr>
+        <p:blipFill>
+          <a:blip r:embed="rId5">
+            <a:extLst>
+              <a:ext uri="{28A0092B-C50C-407E-A947-70E740481C1C}">
+                <a14:useLocalDpi xmlns:a14="http://schemas.microsoft.com/office/drawing/2010/main" val="0"/>
+              </a:ext>
+            </a:extLst>
+          </a:blip>
+          <a:stretch>
+            <a:fillRect/>
+          </a:stretch>
+        </p:blipFill>
+        <p:spPr>
+          <a:xfrm>
+            <a:off x="12" y="2"/>
+            <a:ext cx="4566918" cy="3428994"/>
+          </a:xfrm>
+          <a:prstGeom prst="rect">
+            <a:avLst/>
+          </a:prstGeom>
+        </p:spPr>
+      </p:pic>
+      <p:sp>
+        <p:nvSpPr>
+          <p:cNvPr id="11" name="TextBox 10"/>
+          <p:cNvSpPr txBox="1"/>
+          <p:nvPr/>
+        </p:nvSpPr>
+        <p:spPr>
+          <a:xfrm>
+            <a:off x="1269971" y="6505750"/>
+            <a:ext cx="7485756" cy="369332"/>
+          </a:xfrm>
+          <a:prstGeom prst="rect">
+            <a:avLst/>
+          </a:prstGeom>
+          <a:noFill/>
+        </p:spPr>
+        <p:txBody>
+          <a:bodyPr wrap="none" rtlCol="0">
+            <a:spAutoFit/>
+          </a:bodyPr>
+          <a:lstStyle/>
+          <a:p>
+            <a:r>
+              <a:rPr lang="en-US" dirty="0" smtClean="0"/>
+              <a:t>IBM Blue Gene/Q (ALCF Mira 2014) Nodes: 32 Cores/Node: 1 Total Cores: 32</a:t>
+            </a:r>
+            <a:endParaRPr lang="en-US" dirty="0"/>
+          </a:p>
+        </p:txBody>
+      </p:sp>
+    </p:spTree>
+    <p:extLst>
+      <p:ext uri="{BB962C8B-B14F-4D97-AF65-F5344CB8AC3E}">
+        <p14:creationId xmlns:p14="http://schemas.microsoft.com/office/powerpoint/2010/main" val="2618910600"/>
+      </p:ext>
+    </p:extLst>
+  </p:cSld>
+  <p:clrMapOvr>
+    <a:masterClrMapping/>
+  </p:clrMapOvr>
+  <p:timing>
+    <p:tnLst>
+      <p:par>
+        <p:cTn xmlns:p14="http://schemas.microsoft.com/office/powerpoint/2010/main" id="1" dur="indefinite" restart="never" nodeType="tmRoot"/>
+      </p:par>
+    </p:tnLst>
+  </p:timing>
+</p:sld>
+</file>
+
+<file path=ppt/slides/slide29.xml><?xml version="1.0" encoding="utf-8"?>
+<p:sld xmlns:a="http://schemas.openxmlformats.org/drawingml/2006/main" xmlns:r="http://schemas.openxmlformats.org/officeDocument/2006/relationships" xmlns:p="http://schemas.openxmlformats.org/presentationml/2006/main">
+  <p:cSld>
+    <p:spTree>
+      <p:nvGrpSpPr>
+        <p:cNvPr id="1" name=""/>
+        <p:cNvGrpSpPr/>
+        <p:nvPr/>
+      </p:nvGrpSpPr>
+      <p:grpSpPr>
+        <a:xfrm>
+          <a:off x="0" y="0"/>
+          <a:ext cx="0" cy="0"/>
+          <a:chOff x="0" y="0"/>
+          <a:chExt cx="0" cy="0"/>
+        </a:xfrm>
+      </p:grpSpPr>
+      <p:pic>
+        <p:nvPicPr>
+          <p:cNvPr id="5" name="Picture 4"/>
+          <p:cNvPicPr>
+            <a:picLocks noChangeAspect="1"/>
+          </p:cNvPicPr>
+          <p:nvPr/>
+        </p:nvPicPr>
+        <p:blipFill>
+          <a:blip r:embed="rId2">
+            <a:extLst>
+              <a:ext uri="{28A0092B-C50C-407E-A947-70E740481C1C}">
+                <a14:useLocalDpi xmlns:a14="http://schemas.microsoft.com/office/drawing/2010/main" val="0"/>
+              </a:ext>
+            </a:extLst>
+          </a:blip>
+          <a:stretch>
+            <a:fillRect/>
+          </a:stretch>
+        </p:blipFill>
+        <p:spPr>
+          <a:xfrm>
+            <a:off x="4588695" y="25230"/>
+            <a:ext cx="4566925" cy="3428999"/>
+          </a:xfrm>
+          <a:prstGeom prst="rect">
+            <a:avLst/>
+          </a:prstGeom>
+        </p:spPr>
+      </p:pic>
+      <p:pic>
+        <p:nvPicPr>
+          <p:cNvPr id="6" name="Picture 5"/>
+          <p:cNvPicPr>
+            <a:picLocks noChangeAspect="1"/>
+          </p:cNvPicPr>
+          <p:nvPr/>
+        </p:nvPicPr>
+        <p:blipFill>
+          <a:blip r:embed="rId3">
+            <a:extLst>
+              <a:ext uri="{28A0092B-C50C-407E-A947-70E740481C1C}">
+                <a14:useLocalDpi xmlns:a14="http://schemas.microsoft.com/office/drawing/2010/main" val="0"/>
+              </a:ext>
+            </a:extLst>
+          </a:blip>
+          <a:stretch>
+            <a:fillRect/>
+          </a:stretch>
+        </p:blipFill>
+        <p:spPr>
+          <a:xfrm>
+            <a:off x="21770" y="3462481"/>
+            <a:ext cx="4566924" cy="3428999"/>
+          </a:xfrm>
+          <a:prstGeom prst="rect">
+            <a:avLst/>
+          </a:prstGeom>
+        </p:spPr>
+      </p:pic>
+      <p:pic>
+        <p:nvPicPr>
+          <p:cNvPr id="7" name="Picture 6"/>
+          <p:cNvPicPr>
+            <a:picLocks noChangeAspect="1"/>
+          </p:cNvPicPr>
+          <p:nvPr/>
+        </p:nvPicPr>
+        <p:blipFill>
+          <a:blip r:embed="rId4">
+            <a:extLst>
+              <a:ext uri="{28A0092B-C50C-407E-A947-70E740481C1C}">
+                <a14:useLocalDpi xmlns:a14="http://schemas.microsoft.com/office/drawing/2010/main" val="0"/>
+              </a:ext>
+            </a:extLst>
+          </a:blip>
+          <a:stretch>
+            <a:fillRect/>
+          </a:stretch>
+        </p:blipFill>
+        <p:spPr>
+          <a:xfrm>
+            <a:off x="4588695" y="3471625"/>
+            <a:ext cx="4554747" cy="3419855"/>
+          </a:xfrm>
+          <a:prstGeom prst="rect">
+            <a:avLst/>
+          </a:prstGeom>
+        </p:spPr>
+      </p:pic>
+      <p:pic>
+        <p:nvPicPr>
+          <p:cNvPr id="10" name="Picture 9"/>
+          <p:cNvPicPr>
+            <a:picLocks noChangeAspect="1"/>
+          </p:cNvPicPr>
+          <p:nvPr/>
+        </p:nvPicPr>
+        <p:blipFill>
+          <a:blip r:embed="rId5">
+            <a:extLst>
+              <a:ext uri="{28A0092B-C50C-407E-A947-70E740481C1C}">
+                <a14:useLocalDpi xmlns:a14="http://schemas.microsoft.com/office/drawing/2010/main" val="0"/>
+              </a:ext>
+            </a:extLst>
+          </a:blip>
+          <a:stretch>
+            <a:fillRect/>
+          </a:stretch>
+        </p:blipFill>
+        <p:spPr>
+          <a:xfrm>
+            <a:off x="12" y="2"/>
+            <a:ext cx="4566918" cy="3428995"/>
+          </a:xfrm>
+          <a:prstGeom prst="rect">
+            <a:avLst/>
+          </a:prstGeom>
+        </p:spPr>
+      </p:pic>
+      <p:sp>
+        <p:nvSpPr>
+          <p:cNvPr id="11" name="TextBox 10"/>
+          <p:cNvSpPr txBox="1"/>
+          <p:nvPr/>
+        </p:nvSpPr>
+        <p:spPr>
+          <a:xfrm>
+            <a:off x="1269971" y="6505750"/>
+            <a:ext cx="7485756" cy="369332"/>
+          </a:xfrm>
+          <a:prstGeom prst="rect">
+            <a:avLst/>
+          </a:prstGeom>
+          <a:noFill/>
+        </p:spPr>
+        <p:txBody>
+          <a:bodyPr wrap="none" rtlCol="0">
+            <a:spAutoFit/>
+          </a:bodyPr>
+          <a:lstStyle/>
+          <a:p>
+            <a:r>
+              <a:rPr lang="en-US" dirty="0" smtClean="0"/>
+              <a:t>IBM Blue Gene/Q (ALCF Mira 2014) Nodes: 2 Cores/Node: 16 Total Cores: 32</a:t>
+            </a:r>
+            <a:endParaRPr lang="en-US" dirty="0"/>
+          </a:p>
+        </p:txBody>
+      </p:sp>
+    </p:spTree>
+    <p:extLst>
+      <p:ext uri="{BB962C8B-B14F-4D97-AF65-F5344CB8AC3E}">
+        <p14:creationId xmlns:p14="http://schemas.microsoft.com/office/powerpoint/2010/main" val="4201421907"/>
       </p:ext>
     </p:extLst>
   </p:cSld>
@@ -4441,6 +6226,142 @@
           <a:chExt cx="0" cy="0"/>
         </a:xfrm>
       </p:grpSpPr>
+      <p:sp>
+        <p:nvSpPr>
+          <p:cNvPr id="2" name="Title 1"/>
+          <p:cNvSpPr>
+            <a:spLocks noGrp="1"/>
+          </p:cNvSpPr>
+          <p:nvPr>
+            <p:ph type="title"/>
+          </p:nvPr>
+        </p:nvSpPr>
+        <p:spPr/>
+        <p:txBody>
+          <a:bodyPr>
+            <a:normAutofit/>
+          </a:bodyPr>
+          <a:lstStyle/>
+          <a:p>
+            <a:r>
+              <a:rPr lang="en-US" sz="3600" dirty="0"/>
+              <a:t>IBM IA64 Dual Processors </a:t>
+            </a:r>
+            <a:r>
+              <a:rPr lang="en-US" sz="3600" dirty="0" smtClean="0"/>
+              <a:t>(NCSA IA64)</a:t>
+            </a:r>
+            <a:endParaRPr lang="en-US" sz="3600" dirty="0"/>
+          </a:p>
+        </p:txBody>
+      </p:sp>
+    </p:spTree>
+    <p:extLst>
+      <p:ext uri="{BB962C8B-B14F-4D97-AF65-F5344CB8AC3E}">
+        <p14:creationId xmlns:p14="http://schemas.microsoft.com/office/powerpoint/2010/main" val="329695944"/>
+      </p:ext>
+    </p:extLst>
+  </p:cSld>
+  <p:clrMapOvr>
+    <a:masterClrMapping/>
+  </p:clrMapOvr>
+  <p:timing>
+    <p:tnLst>
+      <p:par>
+        <p:cTn xmlns:p14="http://schemas.microsoft.com/office/powerpoint/2010/main" id="1" dur="indefinite" restart="never" nodeType="tmRoot"/>
+      </p:par>
+    </p:tnLst>
+  </p:timing>
+</p:sld>
+</file>
+
+<file path=ppt/slides/slide30.xml><?xml version="1.0" encoding="utf-8"?>
+<p:sld xmlns:a="http://schemas.openxmlformats.org/drawingml/2006/main" xmlns:r="http://schemas.openxmlformats.org/officeDocument/2006/relationships" xmlns:p="http://schemas.openxmlformats.org/presentationml/2006/main">
+  <p:cSld>
+    <p:spTree>
+      <p:nvGrpSpPr>
+        <p:cNvPr id="1" name=""/>
+        <p:cNvGrpSpPr/>
+        <p:nvPr/>
+      </p:nvGrpSpPr>
+      <p:grpSpPr>
+        <a:xfrm>
+          <a:off x="0" y="0"/>
+          <a:ext cx="0" cy="0"/>
+          <a:chOff x="0" y="0"/>
+          <a:chExt cx="0" cy="0"/>
+        </a:xfrm>
+      </p:grpSpPr>
+      <p:sp>
+        <p:nvSpPr>
+          <p:cNvPr id="2" name="Title 1"/>
+          <p:cNvSpPr>
+            <a:spLocks noGrp="1"/>
+          </p:cNvSpPr>
+          <p:nvPr>
+            <p:ph type="title"/>
+          </p:nvPr>
+        </p:nvSpPr>
+        <p:spPr/>
+        <p:txBody>
+          <a:bodyPr>
+            <a:normAutofit/>
+          </a:bodyPr>
+          <a:lstStyle/>
+          <a:p>
+            <a:r>
+              <a:rPr lang="en-US" dirty="0" smtClean="0"/>
+              <a:t>Cray XE6/XK7</a:t>
+            </a:r>
+            <a:r>
+              <a:rPr lang="en-US" dirty="0"/>
+              <a:t> </a:t>
+            </a:r>
+            <a:r>
+              <a:rPr lang="en-US" dirty="0" smtClean="0"/>
+              <a:t>(NCSA Blue Waters)</a:t>
+            </a:r>
+            <a:endParaRPr lang="en-US" dirty="0"/>
+          </a:p>
+        </p:txBody>
+      </p:sp>
+    </p:spTree>
+    <p:extLst>
+      <p:ext uri="{BB962C8B-B14F-4D97-AF65-F5344CB8AC3E}">
+        <p14:creationId xmlns:p14="http://schemas.microsoft.com/office/powerpoint/2010/main" val="1477469183"/>
+      </p:ext>
+    </p:extLst>
+  </p:cSld>
+  <p:clrMapOvr>
+    <a:masterClrMapping/>
+  </p:clrMapOvr>
+  <p:timing>
+    <p:tnLst>
+      <p:par>
+        <p:cTn xmlns:p14="http://schemas.microsoft.com/office/powerpoint/2010/main" id="1" dur="indefinite" restart="never" nodeType="tmRoot"/>
+      </p:par>
+    </p:tnLst>
+  </p:timing>
+</p:sld>
+</file>
+
+<file path=ppt/slides/slide31.xml><?xml version="1.0" encoding="utf-8"?>
+<p:sld xmlns:a="http://schemas.openxmlformats.org/drawingml/2006/main" xmlns:r="http://schemas.openxmlformats.org/officeDocument/2006/relationships" xmlns:p="http://schemas.openxmlformats.org/presentationml/2006/main">
+  <p:cSld>
+    <p:spTree>
+      <p:nvGrpSpPr>
+        <p:cNvPr id="1" name=""/>
+        <p:cNvGrpSpPr/>
+        <p:nvPr/>
+      </p:nvGrpSpPr>
+      <p:grpSpPr>
+        <a:xfrm>
+          <a:off x="0" y="0"/>
+          <a:ext cx="0" cy="0"/>
+          <a:chOff x="0" y="0"/>
+          <a:chExt cx="0" cy="0"/>
+        </a:xfrm>
+      </p:grpSpPr>
       <p:pic>
         <p:nvPicPr>
           <p:cNvPr id="5" name="Picture 4"/>
@@ -4464,7 +6385,7 @@
         <p:spPr>
           <a:xfrm>
             <a:off x="4588695" y="25230"/>
-            <a:ext cx="4566924" cy="3428999"/>
+            <a:ext cx="4566924" cy="3428998"/>
           </a:xfrm>
           <a:prstGeom prst="rect">
             <a:avLst/>
@@ -4493,8 +6414,8 @@
         </p:blipFill>
         <p:spPr>
           <a:xfrm>
-            <a:off x="21770" y="3462481"/>
-            <a:ext cx="4566924" cy="3428998"/>
+            <a:off x="21771" y="3462481"/>
+            <a:ext cx="4566922" cy="3428998"/>
           </a:xfrm>
           <a:prstGeom prst="rect">
             <a:avLst/>
@@ -4524,7 +6445,7 @@
         <p:spPr>
           <a:xfrm>
             <a:off x="4588696" y="3471625"/>
-            <a:ext cx="4554745" cy="3419855"/>
+            <a:ext cx="4554745" cy="3419854"/>
           </a:xfrm>
           <a:prstGeom prst="rect">
             <a:avLst/>
@@ -4554,7 +6475,7 @@
         <p:spPr>
           <a:xfrm>
             <a:off x="12" y="2"/>
-            <a:ext cx="4566918" cy="3428994"/>
+            <a:ext cx="4566917" cy="3428994"/>
           </a:xfrm>
           <a:prstGeom prst="rect">
             <a:avLst/>
@@ -4569,8 +6490,8 @@
         </p:nvSpPr>
         <p:spPr>
           <a:xfrm>
-            <a:off x="1124827" y="6505750"/>
-            <a:ext cx="7140972" cy="369332"/>
+            <a:off x="1269971" y="6505750"/>
+            <a:ext cx="7153596" cy="369332"/>
           </a:xfrm>
           <a:prstGeom prst="rect">
             <a:avLst/>
@@ -4585,7 +6506,7 @@
           <a:p>
             <a:r>
               <a:rPr lang="en-US" dirty="0" smtClean="0"/>
-              <a:t>Cray XE6 (NSF Blue Waters 2014) Nodes: 1 Cores/Node: 32 Total Cores: 32</a:t>
+              <a:t>Cray XE6 (NSF Blue Waters 2014) Nodes: 32 Cores/Node: 1 Total Cores: 32</a:t>
             </a:r>
             <a:endParaRPr lang="en-US" dirty="0"/>
           </a:p>
@@ -4594,7 +6515,568 @@
     </p:spTree>
     <p:extLst>
       <p:ext uri="{BB962C8B-B14F-4D97-AF65-F5344CB8AC3E}">
-        <p14:creationId xmlns:p14="http://schemas.microsoft.com/office/powerpoint/2010/main" val="1560048652"/>
+        <p14:creationId xmlns:p14="http://schemas.microsoft.com/office/powerpoint/2010/main" val="2231635259"/>
+      </p:ext>
+    </p:extLst>
+  </p:cSld>
+  <p:clrMapOvr>
+    <a:masterClrMapping/>
+  </p:clrMapOvr>
+  <p:timing>
+    <p:tnLst>
+      <p:par>
+        <p:cTn xmlns:p14="http://schemas.microsoft.com/office/powerpoint/2010/main" id="1" dur="indefinite" restart="never" nodeType="tmRoot"/>
+      </p:par>
+    </p:tnLst>
+  </p:timing>
+</p:sld>
+</file>
+
+<file path=ppt/slides/slide32.xml><?xml version="1.0" encoding="utf-8"?>
+<p:sld xmlns:a="http://schemas.openxmlformats.org/drawingml/2006/main" xmlns:r="http://schemas.openxmlformats.org/officeDocument/2006/relationships" xmlns:p="http://schemas.openxmlformats.org/presentationml/2006/main">
+  <p:cSld>
+    <p:spTree>
+      <p:nvGrpSpPr>
+        <p:cNvPr id="1" name=""/>
+        <p:cNvGrpSpPr/>
+        <p:nvPr/>
+      </p:nvGrpSpPr>
+      <p:grpSpPr>
+        <a:xfrm>
+          <a:off x="0" y="0"/>
+          <a:ext cx="0" cy="0"/>
+          <a:chOff x="0" y="0"/>
+          <a:chExt cx="0" cy="0"/>
+        </a:xfrm>
+      </p:grpSpPr>
+      <p:pic>
+        <p:nvPicPr>
+          <p:cNvPr id="5" name="Picture 4"/>
+          <p:cNvPicPr>
+            <a:picLocks noChangeAspect="1"/>
+          </p:cNvPicPr>
+          <p:nvPr/>
+        </p:nvPicPr>
+        <p:blipFill>
+          <a:blip r:embed="rId2">
+            <a:extLst>
+              <a:ext uri="{28A0092B-C50C-407E-A947-70E740481C1C}">
+                <a14:useLocalDpi xmlns:a14="http://schemas.microsoft.com/office/drawing/2010/main" val="0"/>
+              </a:ext>
+            </a:extLst>
+          </a:blip>
+          <a:stretch>
+            <a:fillRect/>
+          </a:stretch>
+        </p:blipFill>
+        <p:spPr>
+          <a:xfrm>
+            <a:off x="4588695" y="25230"/>
+            <a:ext cx="4566924" cy="3428999"/>
+          </a:xfrm>
+          <a:prstGeom prst="rect">
+            <a:avLst/>
+          </a:prstGeom>
+        </p:spPr>
+      </p:pic>
+      <p:pic>
+        <p:nvPicPr>
+          <p:cNvPr id="6" name="Picture 5"/>
+          <p:cNvPicPr>
+            <a:picLocks noChangeAspect="1"/>
+          </p:cNvPicPr>
+          <p:nvPr/>
+        </p:nvPicPr>
+        <p:blipFill>
+          <a:blip r:embed="rId3">
+            <a:extLst>
+              <a:ext uri="{28A0092B-C50C-407E-A947-70E740481C1C}">
+                <a14:useLocalDpi xmlns:a14="http://schemas.microsoft.com/office/drawing/2010/main" val="0"/>
+              </a:ext>
+            </a:extLst>
+          </a:blip>
+          <a:stretch>
+            <a:fillRect/>
+          </a:stretch>
+        </p:blipFill>
+        <p:spPr>
+          <a:xfrm>
+            <a:off x="21770" y="3462481"/>
+            <a:ext cx="4566924" cy="3428998"/>
+          </a:xfrm>
+          <a:prstGeom prst="rect">
+            <a:avLst/>
+          </a:prstGeom>
+        </p:spPr>
+      </p:pic>
+      <p:pic>
+        <p:nvPicPr>
+          <p:cNvPr id="7" name="Picture 6"/>
+          <p:cNvPicPr>
+            <a:picLocks noChangeAspect="1"/>
+          </p:cNvPicPr>
+          <p:nvPr/>
+        </p:nvPicPr>
+        <p:blipFill>
+          <a:blip r:embed="rId4">
+            <a:extLst>
+              <a:ext uri="{28A0092B-C50C-407E-A947-70E740481C1C}">
+                <a14:useLocalDpi xmlns:a14="http://schemas.microsoft.com/office/drawing/2010/main" val="0"/>
+              </a:ext>
+            </a:extLst>
+          </a:blip>
+          <a:stretch>
+            <a:fillRect/>
+          </a:stretch>
+        </p:blipFill>
+        <p:spPr>
+          <a:xfrm>
+            <a:off x="4588696" y="3471625"/>
+            <a:ext cx="4554745" cy="3419855"/>
+          </a:xfrm>
+          <a:prstGeom prst="rect">
+            <a:avLst/>
+          </a:prstGeom>
+        </p:spPr>
+      </p:pic>
+      <p:pic>
+        <p:nvPicPr>
+          <p:cNvPr id="10" name="Picture 9"/>
+          <p:cNvPicPr>
+            <a:picLocks noChangeAspect="1"/>
+          </p:cNvPicPr>
+          <p:nvPr/>
+        </p:nvPicPr>
+        <p:blipFill>
+          <a:blip r:embed="rId5">
+            <a:extLst>
+              <a:ext uri="{28A0092B-C50C-407E-A947-70E740481C1C}">
+                <a14:useLocalDpi xmlns:a14="http://schemas.microsoft.com/office/drawing/2010/main" val="0"/>
+              </a:ext>
+            </a:extLst>
+          </a:blip>
+          <a:stretch>
+            <a:fillRect/>
+          </a:stretch>
+        </p:blipFill>
+        <p:spPr>
+          <a:xfrm>
+            <a:off x="12" y="2"/>
+            <a:ext cx="4566918" cy="3428994"/>
+          </a:xfrm>
+          <a:prstGeom prst="rect">
+            <a:avLst/>
+          </a:prstGeom>
+        </p:spPr>
+      </p:pic>
+      <p:sp>
+        <p:nvSpPr>
+          <p:cNvPr id="11" name="TextBox 10"/>
+          <p:cNvSpPr txBox="1"/>
+          <p:nvPr/>
+        </p:nvSpPr>
+        <p:spPr>
+          <a:xfrm>
+            <a:off x="1124827" y="6505750"/>
+            <a:ext cx="7140972" cy="369332"/>
+          </a:xfrm>
+          <a:prstGeom prst="rect">
+            <a:avLst/>
+          </a:prstGeom>
+          <a:noFill/>
+        </p:spPr>
+        <p:txBody>
+          <a:bodyPr wrap="none" rtlCol="0">
+            <a:spAutoFit/>
+          </a:bodyPr>
+          <a:lstStyle/>
+          <a:p>
+            <a:r>
+              <a:rPr lang="en-US" dirty="0" smtClean="0"/>
+              <a:t>Cray XE6 (NSF Blue Waters 2014) Nodes: 1 Cores/Node: 32 Total Cores: 32</a:t>
+            </a:r>
+            <a:endParaRPr lang="en-US" dirty="0"/>
+          </a:p>
+        </p:txBody>
+      </p:sp>
+    </p:spTree>
+    <p:extLst>
+      <p:ext uri="{BB962C8B-B14F-4D97-AF65-F5344CB8AC3E}">
+        <p14:creationId xmlns:p14="http://schemas.microsoft.com/office/powerpoint/2010/main" val="2863823412"/>
+      </p:ext>
+    </p:extLst>
+  </p:cSld>
+  <p:clrMapOvr>
+    <a:masterClrMapping/>
+  </p:clrMapOvr>
+  <p:timing>
+    <p:tnLst>
+      <p:par>
+        <p:cTn xmlns:p14="http://schemas.microsoft.com/office/powerpoint/2010/main" id="1" dur="indefinite" restart="never" nodeType="tmRoot"/>
+      </p:par>
+    </p:tnLst>
+  </p:timing>
+</p:sld>
+</file>
+
+<file path=ppt/slides/slide33.xml><?xml version="1.0" encoding="utf-8"?>
+<p:sld xmlns:a="http://schemas.openxmlformats.org/drawingml/2006/main" xmlns:r="http://schemas.openxmlformats.org/officeDocument/2006/relationships" xmlns:p="http://schemas.openxmlformats.org/presentationml/2006/main">
+  <p:cSld>
+    <p:spTree>
+      <p:nvGrpSpPr>
+        <p:cNvPr id="1" name=""/>
+        <p:cNvGrpSpPr/>
+        <p:nvPr/>
+      </p:nvGrpSpPr>
+      <p:grpSpPr>
+        <a:xfrm>
+          <a:off x="0" y="0"/>
+          <a:ext cx="0" cy="0"/>
+          <a:chOff x="0" y="0"/>
+          <a:chExt cx="0" cy="0"/>
+        </a:xfrm>
+      </p:grpSpPr>
+      <p:pic>
+        <p:nvPicPr>
+          <p:cNvPr id="5" name="Picture 4"/>
+          <p:cNvPicPr>
+            <a:picLocks noChangeAspect="1"/>
+          </p:cNvPicPr>
+          <p:nvPr/>
+        </p:nvPicPr>
+        <p:blipFill>
+          <a:blip r:embed="rId2">
+            <a:extLst>
+              <a:ext uri="{28A0092B-C50C-407E-A947-70E740481C1C}">
+                <a14:useLocalDpi xmlns:a14="http://schemas.microsoft.com/office/drawing/2010/main" val="0"/>
+              </a:ext>
+            </a:extLst>
+          </a:blip>
+          <a:stretch>
+            <a:fillRect/>
+          </a:stretch>
+        </p:blipFill>
+        <p:spPr>
+          <a:xfrm>
+            <a:off x="4588695" y="25230"/>
+            <a:ext cx="4566924" cy="3428999"/>
+          </a:xfrm>
+          <a:prstGeom prst="rect">
+            <a:avLst/>
+          </a:prstGeom>
+        </p:spPr>
+      </p:pic>
+      <p:pic>
+        <p:nvPicPr>
+          <p:cNvPr id="6" name="Picture 5"/>
+          <p:cNvPicPr>
+            <a:picLocks noChangeAspect="1"/>
+          </p:cNvPicPr>
+          <p:nvPr/>
+        </p:nvPicPr>
+        <p:blipFill>
+          <a:blip r:embed="rId3">
+            <a:extLst>
+              <a:ext uri="{28A0092B-C50C-407E-A947-70E740481C1C}">
+                <a14:useLocalDpi xmlns:a14="http://schemas.microsoft.com/office/drawing/2010/main" val="0"/>
+              </a:ext>
+            </a:extLst>
+          </a:blip>
+          <a:stretch>
+            <a:fillRect/>
+          </a:stretch>
+        </p:blipFill>
+        <p:spPr>
+          <a:xfrm>
+            <a:off x="21770" y="3462481"/>
+            <a:ext cx="4566924" cy="3428998"/>
+          </a:xfrm>
+          <a:prstGeom prst="rect">
+            <a:avLst/>
+          </a:prstGeom>
+        </p:spPr>
+      </p:pic>
+      <p:pic>
+        <p:nvPicPr>
+          <p:cNvPr id="7" name="Picture 6"/>
+          <p:cNvPicPr>
+            <a:picLocks noChangeAspect="1"/>
+          </p:cNvPicPr>
+          <p:nvPr/>
+        </p:nvPicPr>
+        <p:blipFill>
+          <a:blip r:embed="rId4">
+            <a:extLst>
+              <a:ext uri="{28A0092B-C50C-407E-A947-70E740481C1C}">
+                <a14:useLocalDpi xmlns:a14="http://schemas.microsoft.com/office/drawing/2010/main" val="0"/>
+              </a:ext>
+            </a:extLst>
+          </a:blip>
+          <a:stretch>
+            <a:fillRect/>
+          </a:stretch>
+        </p:blipFill>
+        <p:spPr>
+          <a:xfrm>
+            <a:off x="4588696" y="3471625"/>
+            <a:ext cx="4554745" cy="3419855"/>
+          </a:xfrm>
+          <a:prstGeom prst="rect">
+            <a:avLst/>
+          </a:prstGeom>
+        </p:spPr>
+      </p:pic>
+      <p:pic>
+        <p:nvPicPr>
+          <p:cNvPr id="10" name="Picture 9"/>
+          <p:cNvPicPr>
+            <a:picLocks noChangeAspect="1"/>
+          </p:cNvPicPr>
+          <p:nvPr/>
+        </p:nvPicPr>
+        <p:blipFill>
+          <a:blip r:embed="rId5">
+            <a:extLst>
+              <a:ext uri="{28A0092B-C50C-407E-A947-70E740481C1C}">
+                <a14:useLocalDpi xmlns:a14="http://schemas.microsoft.com/office/drawing/2010/main" val="0"/>
+              </a:ext>
+            </a:extLst>
+          </a:blip>
+          <a:stretch>
+            <a:fillRect/>
+          </a:stretch>
+        </p:blipFill>
+        <p:spPr>
+          <a:xfrm>
+            <a:off x="12" y="2"/>
+            <a:ext cx="4566918" cy="3428994"/>
+          </a:xfrm>
+          <a:prstGeom prst="rect">
+            <a:avLst/>
+          </a:prstGeom>
+        </p:spPr>
+      </p:pic>
+      <p:sp>
+        <p:nvSpPr>
+          <p:cNvPr id="11" name="TextBox 10"/>
+          <p:cNvSpPr txBox="1"/>
+          <p:nvPr/>
+        </p:nvSpPr>
+        <p:spPr>
+          <a:xfrm>
+            <a:off x="1269971" y="6505750"/>
+            <a:ext cx="7298768" cy="369332"/>
+          </a:xfrm>
+          <a:prstGeom prst="rect">
+            <a:avLst/>
+          </a:prstGeom>
+          <a:noFill/>
+        </p:spPr>
+        <p:txBody>
+          <a:bodyPr wrap="none" rtlCol="0">
+            <a:spAutoFit/>
+          </a:bodyPr>
+          <a:lstStyle/>
+          <a:p>
+            <a:r>
+              <a:rPr lang="en-US" dirty="0" smtClean="0"/>
+              <a:t>Cray XK7 (NCSA Blue Waters 2014) Nodes: 32 Cores/Node: 1 Total Cores: 32</a:t>
+            </a:r>
+            <a:endParaRPr lang="en-US" dirty="0"/>
+          </a:p>
+        </p:txBody>
+      </p:sp>
+    </p:spTree>
+    <p:extLst>
+      <p:ext uri="{BB962C8B-B14F-4D97-AF65-F5344CB8AC3E}">
+        <p14:creationId xmlns:p14="http://schemas.microsoft.com/office/powerpoint/2010/main" val="3230009095"/>
+      </p:ext>
+    </p:extLst>
+  </p:cSld>
+  <p:clrMapOvr>
+    <a:masterClrMapping/>
+  </p:clrMapOvr>
+  <p:timing>
+    <p:tnLst>
+      <p:par>
+        <p:cTn xmlns:p14="http://schemas.microsoft.com/office/powerpoint/2010/main" id="1" dur="indefinite" restart="never" nodeType="tmRoot"/>
+      </p:par>
+    </p:tnLst>
+  </p:timing>
+</p:sld>
+</file>
+
+<file path=ppt/slides/slide34.xml><?xml version="1.0" encoding="utf-8"?>
+<p:sld xmlns:a="http://schemas.openxmlformats.org/drawingml/2006/main" xmlns:r="http://schemas.openxmlformats.org/officeDocument/2006/relationships" xmlns:p="http://schemas.openxmlformats.org/presentationml/2006/main">
+  <p:cSld>
+    <p:spTree>
+      <p:nvGrpSpPr>
+        <p:cNvPr id="1" name=""/>
+        <p:cNvGrpSpPr/>
+        <p:nvPr/>
+      </p:nvGrpSpPr>
+      <p:grpSpPr>
+        <a:xfrm>
+          <a:off x="0" y="0"/>
+          <a:ext cx="0" cy="0"/>
+          <a:chOff x="0" y="0"/>
+          <a:chExt cx="0" cy="0"/>
+        </a:xfrm>
+      </p:grpSpPr>
+      <p:pic>
+        <p:nvPicPr>
+          <p:cNvPr id="5" name="Picture 4"/>
+          <p:cNvPicPr>
+            <a:picLocks noChangeAspect="1"/>
+          </p:cNvPicPr>
+          <p:nvPr/>
+        </p:nvPicPr>
+        <p:blipFill>
+          <a:blip r:embed="rId2">
+            <a:extLst>
+              <a:ext uri="{28A0092B-C50C-407E-A947-70E740481C1C}">
+                <a14:useLocalDpi xmlns:a14="http://schemas.microsoft.com/office/drawing/2010/main" val="0"/>
+              </a:ext>
+            </a:extLst>
+          </a:blip>
+          <a:stretch>
+            <a:fillRect/>
+          </a:stretch>
+        </p:blipFill>
+        <p:spPr>
+          <a:xfrm>
+            <a:off x="4588695" y="25230"/>
+            <a:ext cx="4566924" cy="3428998"/>
+          </a:xfrm>
+          <a:prstGeom prst="rect">
+            <a:avLst/>
+          </a:prstGeom>
+        </p:spPr>
+      </p:pic>
+      <p:pic>
+        <p:nvPicPr>
+          <p:cNvPr id="6" name="Picture 5"/>
+          <p:cNvPicPr>
+            <a:picLocks noChangeAspect="1"/>
+          </p:cNvPicPr>
+          <p:nvPr/>
+        </p:nvPicPr>
+        <p:blipFill>
+          <a:blip r:embed="rId3">
+            <a:extLst>
+              <a:ext uri="{28A0092B-C50C-407E-A947-70E740481C1C}">
+                <a14:useLocalDpi xmlns:a14="http://schemas.microsoft.com/office/drawing/2010/main" val="0"/>
+              </a:ext>
+            </a:extLst>
+          </a:blip>
+          <a:stretch>
+            <a:fillRect/>
+          </a:stretch>
+        </p:blipFill>
+        <p:spPr>
+          <a:xfrm>
+            <a:off x="21771" y="3462481"/>
+            <a:ext cx="4566922" cy="3428998"/>
+          </a:xfrm>
+          <a:prstGeom prst="rect">
+            <a:avLst/>
+          </a:prstGeom>
+        </p:spPr>
+      </p:pic>
+      <p:pic>
+        <p:nvPicPr>
+          <p:cNvPr id="7" name="Picture 6"/>
+          <p:cNvPicPr>
+            <a:picLocks noChangeAspect="1"/>
+          </p:cNvPicPr>
+          <p:nvPr/>
+        </p:nvPicPr>
+        <p:blipFill>
+          <a:blip r:embed="rId4">
+            <a:extLst>
+              <a:ext uri="{28A0092B-C50C-407E-A947-70E740481C1C}">
+                <a14:useLocalDpi xmlns:a14="http://schemas.microsoft.com/office/drawing/2010/main" val="0"/>
+              </a:ext>
+            </a:extLst>
+          </a:blip>
+          <a:stretch>
+            <a:fillRect/>
+          </a:stretch>
+        </p:blipFill>
+        <p:spPr>
+          <a:xfrm>
+            <a:off x="4588696" y="3471625"/>
+            <a:ext cx="4554745" cy="3419854"/>
+          </a:xfrm>
+          <a:prstGeom prst="rect">
+            <a:avLst/>
+          </a:prstGeom>
+        </p:spPr>
+      </p:pic>
+      <p:pic>
+        <p:nvPicPr>
+          <p:cNvPr id="10" name="Picture 9"/>
+          <p:cNvPicPr>
+            <a:picLocks noChangeAspect="1"/>
+          </p:cNvPicPr>
+          <p:nvPr/>
+        </p:nvPicPr>
+        <p:blipFill>
+          <a:blip r:embed="rId5">
+            <a:extLst>
+              <a:ext uri="{28A0092B-C50C-407E-A947-70E740481C1C}">
+                <a14:useLocalDpi xmlns:a14="http://schemas.microsoft.com/office/drawing/2010/main" val="0"/>
+              </a:ext>
+            </a:extLst>
+          </a:blip>
+          <a:stretch>
+            <a:fillRect/>
+          </a:stretch>
+        </p:blipFill>
+        <p:spPr>
+          <a:xfrm>
+            <a:off x="12" y="2"/>
+            <a:ext cx="4566917" cy="3428994"/>
+          </a:xfrm>
+          <a:prstGeom prst="rect">
+            <a:avLst/>
+          </a:prstGeom>
+        </p:spPr>
+      </p:pic>
+      <p:sp>
+        <p:nvSpPr>
+          <p:cNvPr id="11" name="TextBox 10"/>
+          <p:cNvSpPr txBox="1"/>
+          <p:nvPr/>
+        </p:nvSpPr>
+        <p:spPr>
+          <a:xfrm>
+            <a:off x="1269971" y="6505750"/>
+            <a:ext cx="7298768" cy="369332"/>
+          </a:xfrm>
+          <a:prstGeom prst="rect">
+            <a:avLst/>
+          </a:prstGeom>
+          <a:noFill/>
+        </p:spPr>
+        <p:txBody>
+          <a:bodyPr wrap="none" rtlCol="0">
+            <a:spAutoFit/>
+          </a:bodyPr>
+          <a:lstStyle/>
+          <a:p>
+            <a:r>
+              <a:rPr lang="en-US" dirty="0" smtClean="0"/>
+              <a:t>Cray XK7 (NCSA Blue Waters 2014) Nodes: 2 Cores/Node: 16 Total Cores: 32</a:t>
+            </a:r>
+            <a:endParaRPr lang="en-US" dirty="0"/>
+          </a:p>
+        </p:txBody>
+      </p:sp>
+    </p:spTree>
+    <p:extLst>
+      <p:ext uri="{BB962C8B-B14F-4D97-AF65-F5344CB8AC3E}">
+        <p14:creationId xmlns:p14="http://schemas.microsoft.com/office/powerpoint/2010/main" val="198733989"/>
       </p:ext>
     </p:extLst>
   </p:cSld>
@@ -4650,8 +7132,8 @@
         </p:blipFill>
         <p:spPr>
           <a:xfrm>
-            <a:off x="4588695" y="25230"/>
-            <a:ext cx="4566924" cy="3428998"/>
+            <a:off x="4588695" y="27133"/>
+            <a:ext cx="4566924" cy="3425193"/>
           </a:xfrm>
           <a:prstGeom prst="rect">
             <a:avLst/>
@@ -4680,8 +7162,8 @@
         </p:blipFill>
         <p:spPr>
           <a:xfrm>
-            <a:off x="21771" y="3462481"/>
-            <a:ext cx="4566922" cy="3428998"/>
+            <a:off x="21770" y="3464384"/>
+            <a:ext cx="4566924" cy="3425193"/>
           </a:xfrm>
           <a:prstGeom prst="rect">
             <a:avLst/>
@@ -4710,8 +7192,8 @@
         </p:blipFill>
         <p:spPr>
           <a:xfrm>
-            <a:off x="4588696" y="3471625"/>
-            <a:ext cx="4554745" cy="3419854"/>
+            <a:off x="4588695" y="3473522"/>
+            <a:ext cx="4554748" cy="3416061"/>
           </a:xfrm>
           <a:prstGeom prst="rect">
             <a:avLst/>
@@ -4740,8 +7222,8 @@
         </p:blipFill>
         <p:spPr>
           <a:xfrm>
-            <a:off x="12" y="2"/>
-            <a:ext cx="4566917" cy="3428994"/>
+            <a:off x="12" y="1905"/>
+            <a:ext cx="4566916" cy="3425187"/>
           </a:xfrm>
           <a:prstGeom prst="rect">
             <a:avLst/>
@@ -4756,8 +7238,8 @@
         </p:nvSpPr>
         <p:spPr>
           <a:xfrm>
-            <a:off x="1269971" y="6505750"/>
-            <a:ext cx="7153596" cy="369332"/>
+            <a:off x="1314911" y="6538394"/>
+            <a:ext cx="5731069" cy="369332"/>
           </a:xfrm>
           <a:prstGeom prst="rect">
             <a:avLst/>
@@ -4772,7 +7254,7 @@
           <a:p>
             <a:r>
               <a:rPr lang="en-US" dirty="0" smtClean="0"/>
-              <a:t>Cray XE6 (NSF Blue Waters 2014) Nodes: 32 Cores/Node: 1 Total Cores: 32</a:t>
+              <a:t>IBM IA64 Dual Processors (NCSA IA64 2008) Total Cores: 32</a:t>
             </a:r>
             <a:endParaRPr lang="en-US" dirty="0"/>
           </a:p>
@@ -4781,7 +7263,7 @@
     </p:spTree>
     <p:extLst>
       <p:ext uri="{BB962C8B-B14F-4D97-AF65-F5344CB8AC3E}">
-        <p14:creationId xmlns:p14="http://schemas.microsoft.com/office/powerpoint/2010/main" val="1466601424"/>
+        <p14:creationId xmlns:p14="http://schemas.microsoft.com/office/powerpoint/2010/main" val="4272087848"/>
       </p:ext>
     </p:extLst>
   </p:cSld>
@@ -4815,160 +7297,35 @@
           <a:chExt cx="0" cy="0"/>
         </a:xfrm>
       </p:grpSpPr>
-      <p:pic>
-        <p:nvPicPr>
-          <p:cNvPr id="5" name="Picture 4"/>
-          <p:cNvPicPr>
-            <a:picLocks noChangeAspect="1"/>
-          </p:cNvPicPr>
-          <p:nvPr/>
-        </p:nvPicPr>
-        <p:blipFill>
-          <a:blip r:embed="rId2">
-            <a:extLst>
-              <a:ext uri="{28A0092B-C50C-407E-A947-70E740481C1C}">
-                <a14:useLocalDpi xmlns:a14="http://schemas.microsoft.com/office/drawing/2010/main" val="0"/>
-              </a:ext>
-            </a:extLst>
-          </a:blip>
-          <a:stretch>
-            <a:fillRect/>
-          </a:stretch>
-        </p:blipFill>
-        <p:spPr>
-          <a:xfrm>
-            <a:off x="4588695" y="25230"/>
-            <a:ext cx="4566924" cy="3428999"/>
-          </a:xfrm>
-          <a:prstGeom prst="rect">
-            <a:avLst/>
-          </a:prstGeom>
-        </p:spPr>
-      </p:pic>
-      <p:pic>
-        <p:nvPicPr>
-          <p:cNvPr id="6" name="Picture 5"/>
-          <p:cNvPicPr>
-            <a:picLocks noChangeAspect="1"/>
-          </p:cNvPicPr>
-          <p:nvPr/>
-        </p:nvPicPr>
-        <p:blipFill>
-          <a:blip r:embed="rId3">
-            <a:extLst>
-              <a:ext uri="{28A0092B-C50C-407E-A947-70E740481C1C}">
-                <a14:useLocalDpi xmlns:a14="http://schemas.microsoft.com/office/drawing/2010/main" val="0"/>
-              </a:ext>
-            </a:extLst>
-          </a:blip>
-          <a:stretch>
-            <a:fillRect/>
-          </a:stretch>
-        </p:blipFill>
-        <p:spPr>
-          <a:xfrm>
-            <a:off x="21770" y="3462481"/>
-            <a:ext cx="4566924" cy="3428998"/>
-          </a:xfrm>
-          <a:prstGeom prst="rect">
-            <a:avLst/>
-          </a:prstGeom>
-        </p:spPr>
-      </p:pic>
-      <p:pic>
-        <p:nvPicPr>
-          <p:cNvPr id="7" name="Picture 6"/>
-          <p:cNvPicPr>
-            <a:picLocks noChangeAspect="1"/>
-          </p:cNvPicPr>
-          <p:nvPr/>
-        </p:nvPicPr>
-        <p:blipFill>
-          <a:blip r:embed="rId4">
-            <a:extLst>
-              <a:ext uri="{28A0092B-C50C-407E-A947-70E740481C1C}">
-                <a14:useLocalDpi xmlns:a14="http://schemas.microsoft.com/office/drawing/2010/main" val="0"/>
-              </a:ext>
-            </a:extLst>
-          </a:blip>
-          <a:stretch>
-            <a:fillRect/>
-          </a:stretch>
-        </p:blipFill>
-        <p:spPr>
-          <a:xfrm>
-            <a:off x="4588696" y="3471625"/>
-            <a:ext cx="4554745" cy="3419855"/>
-          </a:xfrm>
-          <a:prstGeom prst="rect">
-            <a:avLst/>
-          </a:prstGeom>
-        </p:spPr>
-      </p:pic>
-      <p:pic>
-        <p:nvPicPr>
-          <p:cNvPr id="10" name="Picture 9"/>
-          <p:cNvPicPr>
-            <a:picLocks noChangeAspect="1"/>
-          </p:cNvPicPr>
-          <p:nvPr/>
-        </p:nvPicPr>
-        <p:blipFill>
-          <a:blip r:embed="rId5">
-            <a:extLst>
-              <a:ext uri="{28A0092B-C50C-407E-A947-70E740481C1C}">
-                <a14:useLocalDpi xmlns:a14="http://schemas.microsoft.com/office/drawing/2010/main" val="0"/>
-              </a:ext>
-            </a:extLst>
-          </a:blip>
-          <a:stretch>
-            <a:fillRect/>
-          </a:stretch>
-        </p:blipFill>
-        <p:spPr>
-          <a:xfrm>
-            <a:off x="12" y="2"/>
-            <a:ext cx="4566918" cy="3428994"/>
-          </a:xfrm>
-          <a:prstGeom prst="rect">
-            <a:avLst/>
-          </a:prstGeom>
-        </p:spPr>
-      </p:pic>
-      <p:sp>
-        <p:nvSpPr>
-          <p:cNvPr id="11" name="TextBox 10"/>
-          <p:cNvSpPr txBox="1"/>
-          <p:nvPr/>
-        </p:nvSpPr>
-        <p:spPr>
-          <a:xfrm>
-            <a:off x="1269971" y="6505750"/>
-            <a:ext cx="7298768" cy="369332"/>
-          </a:xfrm>
-          <a:prstGeom prst="rect">
-            <a:avLst/>
-          </a:prstGeom>
-          <a:noFill/>
-        </p:spPr>
-        <p:txBody>
-          <a:bodyPr wrap="none" rtlCol="0">
-            <a:spAutoFit/>
+      <p:sp>
+        <p:nvSpPr>
+          <p:cNvPr id="2" name="Title 1"/>
+          <p:cNvSpPr>
+            <a:spLocks noGrp="1"/>
+          </p:cNvSpPr>
+          <p:nvPr>
+            <p:ph type="title"/>
+          </p:nvPr>
+        </p:nvSpPr>
+        <p:spPr/>
+        <p:txBody>
+          <a:bodyPr>
+            <a:normAutofit/>
           </a:bodyPr>
           <a:lstStyle/>
           <a:p>
             <a:r>
-              <a:rPr lang="en-US" dirty="0" smtClean="0"/>
-              <a:t>Cray XK7 (NCSA Blue Waters 2014) Nodes: 32 Cores/Node: 1 Total Cores: 32</a:t>
-            </a:r>
-            <a:endParaRPr lang="en-US" dirty="0"/>
+              <a:rPr lang="en-US" sz="3200" dirty="0" smtClean="0"/>
+              <a:t>Dell C8220 Nodes w/ Intel E5 8-Core Sandy Bridge Processors (TACC Stampede)</a:t>
+            </a:r>
+            <a:endParaRPr lang="en-US" sz="3200" dirty="0"/>
           </a:p>
         </p:txBody>
       </p:sp>
     </p:spTree>
     <p:extLst>
       <p:ext uri="{BB962C8B-B14F-4D97-AF65-F5344CB8AC3E}">
-        <p14:creationId xmlns:p14="http://schemas.microsoft.com/office/powerpoint/2010/main" val="1378177077"/>
+        <p14:creationId xmlns:p14="http://schemas.microsoft.com/office/powerpoint/2010/main" val="182232299"/>
       </p:ext>
     </p:extLst>
   </p:cSld>
@@ -5025,7 +7382,7 @@
         <p:spPr>
           <a:xfrm>
             <a:off x="4588695" y="25230"/>
-            <a:ext cx="4566924" cy="3428998"/>
+            <a:ext cx="4566924" cy="3428999"/>
           </a:xfrm>
           <a:prstGeom prst="rect">
             <a:avLst/>
@@ -5054,8 +7411,8 @@
         </p:blipFill>
         <p:spPr>
           <a:xfrm>
-            <a:off x="21771" y="3462481"/>
-            <a:ext cx="4566922" cy="3428998"/>
+            <a:off x="21770" y="3462481"/>
+            <a:ext cx="4566924" cy="3428998"/>
           </a:xfrm>
           <a:prstGeom prst="rect">
             <a:avLst/>
@@ -5085,7 +7442,7 @@
         <p:spPr>
           <a:xfrm>
             <a:off x="4588696" y="3471625"/>
-            <a:ext cx="4554745" cy="3419854"/>
+            <a:ext cx="4554745" cy="3419855"/>
           </a:xfrm>
           <a:prstGeom prst="rect">
             <a:avLst/>
@@ -5115,7 +7472,7 @@
         <p:spPr>
           <a:xfrm>
             <a:off x="12" y="2"/>
-            <a:ext cx="4566917" cy="3428994"/>
+            <a:ext cx="4566918" cy="3428994"/>
           </a:xfrm>
           <a:prstGeom prst="rect">
             <a:avLst/>
@@ -5131,7 +7488,7 @@
         <p:spPr>
           <a:xfrm>
             <a:off x="1269971" y="6505750"/>
-            <a:ext cx="7298768" cy="369332"/>
+            <a:ext cx="7924089" cy="369332"/>
           </a:xfrm>
           <a:prstGeom prst="rect">
             <a:avLst/>
@@ -5146,7 +7503,7 @@
           <a:p>
             <a:r>
               <a:rPr lang="en-US" dirty="0" smtClean="0"/>
-              <a:t>Cray XK7 (NCSA Blue Waters 2014) Nodes: 2 Cores/Node: 16 Total Cores: 32</a:t>
+              <a:t>TACC Dell C3800 (TACC Stampede 2014) Nodes: 32 Cores/Node: 1 Total Cores: 32</a:t>
             </a:r>
             <a:endParaRPr lang="en-US" dirty="0"/>
           </a:p>
@@ -5155,7 +7512,7 @@
     </p:spTree>
     <p:extLst>
       <p:ext uri="{BB962C8B-B14F-4D97-AF65-F5344CB8AC3E}">
-        <p14:creationId xmlns:p14="http://schemas.microsoft.com/office/powerpoint/2010/main" val="852437764"/>
+        <p14:creationId xmlns:p14="http://schemas.microsoft.com/office/powerpoint/2010/main" val="1025206922"/>
       </p:ext>
     </p:extLst>
   </p:cSld>
@@ -5211,8 +7568,8 @@
         </p:blipFill>
         <p:spPr>
           <a:xfrm>
-            <a:off x="4588695" y="27133"/>
-            <a:ext cx="4566926" cy="3425194"/>
+            <a:off x="4588695" y="25230"/>
+            <a:ext cx="4566924" cy="3428998"/>
           </a:xfrm>
           <a:prstGeom prst="rect">
             <a:avLst/>
@@ -5241,8 +7598,8 @@
         </p:blipFill>
         <p:spPr>
           <a:xfrm>
-            <a:off x="21770" y="3464384"/>
-            <a:ext cx="4566925" cy="3425193"/>
+            <a:off x="21771" y="3462481"/>
+            <a:ext cx="4566922" cy="3428998"/>
           </a:xfrm>
           <a:prstGeom prst="rect">
             <a:avLst/>
@@ -5271,8 +7628,8 @@
         </p:blipFill>
         <p:spPr>
           <a:xfrm>
-            <a:off x="4588695" y="3473522"/>
-            <a:ext cx="4554748" cy="3416061"/>
+            <a:off x="4588696" y="3471625"/>
+            <a:ext cx="4554745" cy="3419854"/>
           </a:xfrm>
           <a:prstGeom prst="rect">
             <a:avLst/>
@@ -5301,8 +7658,8 @@
         </p:blipFill>
         <p:spPr>
           <a:xfrm>
-            <a:off x="12" y="1905"/>
-            <a:ext cx="4566919" cy="3425189"/>
+            <a:off x="12" y="2"/>
+            <a:ext cx="4566917" cy="3428994"/>
           </a:xfrm>
           <a:prstGeom prst="rect">
             <a:avLst/>
@@ -5317,8 +7674,8 @@
         </p:nvSpPr>
         <p:spPr>
           <a:xfrm>
-            <a:off x="108819" y="6505750"/>
-            <a:ext cx="8815296" cy="369332"/>
+            <a:off x="1269971" y="6505750"/>
+            <a:ext cx="7924089" cy="369332"/>
           </a:xfrm>
           <a:prstGeom prst="rect">
             <a:avLst/>
@@ -5333,15 +7690,7 @@
           <a:p>
             <a:r>
               <a:rPr lang="en-US" dirty="0" smtClean="0"/>
-              <a:t>IBM P655 8-Processor Nodes  (SDSC </a:t>
-            </a:r>
-            <a:r>
-              <a:rPr lang="en-US" dirty="0" err="1" smtClean="0"/>
-              <a:t>DataStar</a:t>
-            </a:r>
-            <a:r>
-              <a:rPr lang="en-US" dirty="0" smtClean="0"/>
-              <a:t> 2008) Nodes: 2 Cores/Node: 8 Total Cores: 32</a:t>
+              <a:t>TACC Dell C3800 (TACC Stampede 2014) Nodes: 2 Cores/Node: 16 Total Cores: 32</a:t>
             </a:r>
             <a:endParaRPr lang="en-US" dirty="0"/>
           </a:p>
@@ -5350,7 +7699,7 @@
     </p:spTree>
     <p:extLst>
       <p:ext uri="{BB962C8B-B14F-4D97-AF65-F5344CB8AC3E}">
-        <p14:creationId xmlns:p14="http://schemas.microsoft.com/office/powerpoint/2010/main" val="2755411471"/>
+        <p14:creationId xmlns:p14="http://schemas.microsoft.com/office/powerpoint/2010/main" val="2479572579"/>
       </p:ext>
     </p:extLst>
   </p:cSld>
@@ -5384,168 +7733,51 @@
           <a:chExt cx="0" cy="0"/>
         </a:xfrm>
       </p:grpSpPr>
-      <p:pic>
-        <p:nvPicPr>
-          <p:cNvPr id="5" name="Picture 4"/>
-          <p:cNvPicPr>
-            <a:picLocks noChangeAspect="1"/>
-          </p:cNvPicPr>
-          <p:nvPr/>
-        </p:nvPicPr>
-        <p:blipFill>
-          <a:blip r:embed="rId2">
-            <a:extLst>
-              <a:ext uri="{28A0092B-C50C-407E-A947-70E740481C1C}">
-                <a14:useLocalDpi xmlns:a14="http://schemas.microsoft.com/office/drawing/2010/main" val="0"/>
-              </a:ext>
-            </a:extLst>
-          </a:blip>
-          <a:stretch>
-            <a:fillRect/>
-          </a:stretch>
-        </p:blipFill>
-        <p:spPr>
-          <a:xfrm>
-            <a:off x="4588695" y="27133"/>
-            <a:ext cx="4566925" cy="3425194"/>
-          </a:xfrm>
-          <a:prstGeom prst="rect">
-            <a:avLst/>
-          </a:prstGeom>
-        </p:spPr>
-      </p:pic>
-      <p:pic>
-        <p:nvPicPr>
-          <p:cNvPr id="6" name="Picture 5"/>
-          <p:cNvPicPr>
-            <a:picLocks noChangeAspect="1"/>
-          </p:cNvPicPr>
-          <p:nvPr/>
-        </p:nvPicPr>
-        <p:blipFill>
-          <a:blip r:embed="rId3">
-            <a:extLst>
-              <a:ext uri="{28A0092B-C50C-407E-A947-70E740481C1C}">
-                <a14:useLocalDpi xmlns:a14="http://schemas.microsoft.com/office/drawing/2010/main" val="0"/>
-              </a:ext>
-            </a:extLst>
-          </a:blip>
-          <a:stretch>
-            <a:fillRect/>
-          </a:stretch>
-        </p:blipFill>
-        <p:spPr>
-          <a:xfrm>
-            <a:off x="21770" y="3464384"/>
-            <a:ext cx="4566924" cy="3425193"/>
-          </a:xfrm>
-          <a:prstGeom prst="rect">
-            <a:avLst/>
-          </a:prstGeom>
-        </p:spPr>
-      </p:pic>
-      <p:pic>
-        <p:nvPicPr>
-          <p:cNvPr id="7" name="Picture 6"/>
-          <p:cNvPicPr>
-            <a:picLocks noChangeAspect="1"/>
-          </p:cNvPicPr>
-          <p:nvPr/>
-        </p:nvPicPr>
-        <p:blipFill>
-          <a:blip r:embed="rId4">
-            <a:extLst>
-              <a:ext uri="{28A0092B-C50C-407E-A947-70E740481C1C}">
-                <a14:useLocalDpi xmlns:a14="http://schemas.microsoft.com/office/drawing/2010/main" val="0"/>
-              </a:ext>
-            </a:extLst>
-          </a:blip>
-          <a:stretch>
-            <a:fillRect/>
-          </a:stretch>
-        </p:blipFill>
-        <p:spPr>
-          <a:xfrm>
-            <a:off x="4588695" y="3473522"/>
-            <a:ext cx="4554748" cy="3416061"/>
-          </a:xfrm>
-          <a:prstGeom prst="rect">
-            <a:avLst/>
-          </a:prstGeom>
-        </p:spPr>
-      </p:pic>
-      <p:pic>
-        <p:nvPicPr>
-          <p:cNvPr id="10" name="Picture 9"/>
-          <p:cNvPicPr>
-            <a:picLocks noChangeAspect="1"/>
-          </p:cNvPicPr>
-          <p:nvPr/>
-        </p:nvPicPr>
-        <p:blipFill>
-          <a:blip r:embed="rId5">
-            <a:extLst>
-              <a:ext uri="{28A0092B-C50C-407E-A947-70E740481C1C}">
-                <a14:useLocalDpi xmlns:a14="http://schemas.microsoft.com/office/drawing/2010/main" val="0"/>
-              </a:ext>
-            </a:extLst>
-          </a:blip>
-          <a:stretch>
-            <a:fillRect/>
-          </a:stretch>
-        </p:blipFill>
-        <p:spPr>
-          <a:xfrm>
-            <a:off x="12" y="1905"/>
-            <a:ext cx="4566918" cy="3425189"/>
-          </a:xfrm>
-          <a:prstGeom prst="rect">
-            <a:avLst/>
-          </a:prstGeom>
-        </p:spPr>
-      </p:pic>
-      <p:sp>
-        <p:nvSpPr>
-          <p:cNvPr id="11" name="TextBox 10"/>
-          <p:cNvSpPr txBox="1"/>
-          <p:nvPr/>
-        </p:nvSpPr>
-        <p:spPr>
-          <a:xfrm>
-            <a:off x="36098" y="6523893"/>
-            <a:ext cx="9179917" cy="369332"/>
-          </a:xfrm>
-          <a:prstGeom prst="rect">
-            <a:avLst/>
-          </a:prstGeom>
-          <a:noFill/>
-        </p:spPr>
-        <p:txBody>
-          <a:bodyPr wrap="none" rtlCol="0">
-            <a:spAutoFit/>
+      <p:sp>
+        <p:nvSpPr>
+          <p:cNvPr id="2" name="Title 1"/>
+          <p:cNvSpPr>
+            <a:spLocks noGrp="1"/>
+          </p:cNvSpPr>
+          <p:nvPr>
+            <p:ph type="title"/>
+          </p:nvPr>
+        </p:nvSpPr>
+        <p:spPr/>
+        <p:txBody>
+          <a:bodyPr>
+            <a:noAutofit/>
           </a:bodyPr>
           <a:lstStyle/>
           <a:p>
             <a:r>
-              <a:rPr lang="en-US" dirty="0" smtClean="0"/>
-              <a:t>Cray XT3 MPP Dual Processor Nodes  (</a:t>
-            </a:r>
-            <a:r>
-              <a:rPr lang="en-US" dirty="0"/>
-              <a:t>P</a:t>
-            </a:r>
-            <a:r>
-              <a:rPr lang="en-US" dirty="0" smtClean="0"/>
-              <a:t>SC Big Ben 2008) Nodes: 8 Cores/Node: 2 Total Cores: 32</a:t>
-            </a:r>
-            <a:endParaRPr lang="en-US" dirty="0"/>
+              <a:rPr lang="en-US" sz="3200" dirty="0"/>
+              <a:t>IBM P655 8-Processor Nodes </a:t>
+            </a:r>
+            <a:r>
+              <a:rPr lang="en-US" sz="3200" dirty="0" smtClean="0"/>
+              <a:t>(</a:t>
+            </a:r>
+            <a:r>
+              <a:rPr lang="en-US" sz="3200" dirty="0"/>
+              <a:t>SDSC </a:t>
+            </a:r>
+            <a:r>
+              <a:rPr lang="en-US" sz="3200" dirty="0" err="1" smtClean="0"/>
+              <a:t>DataStar</a:t>
+            </a:r>
+            <a:r>
+              <a:rPr lang="en-US" sz="3200" dirty="0" smtClean="0"/>
+              <a:t>)</a:t>
+            </a:r>
+            <a:endParaRPr lang="en-US" sz="3200" dirty="0"/>
           </a:p>
         </p:txBody>
       </p:sp>
     </p:spTree>
     <p:extLst>
       <p:ext uri="{BB962C8B-B14F-4D97-AF65-F5344CB8AC3E}">
-        <p14:creationId xmlns:p14="http://schemas.microsoft.com/office/powerpoint/2010/main" val="2920618168"/>
+        <p14:creationId xmlns:p14="http://schemas.microsoft.com/office/powerpoint/2010/main" val="3463723966"/>
       </p:ext>
     </p:extLst>
   </p:cSld>
@@ -5602,7 +7834,7 @@
         <p:spPr>
           <a:xfrm>
             <a:off x="4588695" y="27133"/>
-            <a:ext cx="4566925" cy="3425193"/>
+            <a:ext cx="4566926" cy="3425194"/>
           </a:xfrm>
           <a:prstGeom prst="rect">
             <a:avLst/>
@@ -5632,7 +7864,7 @@
         <p:spPr>
           <a:xfrm>
             <a:off x="21770" y="3464384"/>
-            <a:ext cx="4566924" cy="3425193"/>
+            <a:ext cx="4566925" cy="3425193"/>
           </a:xfrm>
           <a:prstGeom prst="rect">
             <a:avLst/>
@@ -5692,7 +7924,7 @@
         <p:spPr>
           <a:xfrm>
             <a:off x="12" y="1905"/>
-            <a:ext cx="4566918" cy="3425188"/>
+            <a:ext cx="4566919" cy="3425189"/>
           </a:xfrm>
           <a:prstGeom prst="rect">
             <a:avLst/>
@@ -5707,8 +7939,8 @@
         </p:nvSpPr>
         <p:spPr>
           <a:xfrm>
-            <a:off x="2422538" y="6520251"/>
-            <a:ext cx="5482766" cy="369332"/>
+            <a:off x="108819" y="6505750"/>
+            <a:ext cx="8815296" cy="369332"/>
           </a:xfrm>
           <a:prstGeom prst="rect">
             <a:avLst/>
@@ -5723,7 +7955,15 @@
           <a:p>
             <a:r>
               <a:rPr lang="en-US" dirty="0" smtClean="0"/>
-              <a:t>IBM Blue Gene/L (SDSC Blue Gene 2008) Total Cores: 32</a:t>
+              <a:t>IBM P655 8-Processor Nodes  (SDSC </a:t>
+            </a:r>
+            <a:r>
+              <a:rPr lang="en-US" dirty="0" err="1" smtClean="0"/>
+              <a:t>DataStar</a:t>
+            </a:r>
+            <a:r>
+              <a:rPr lang="en-US" dirty="0" smtClean="0"/>
+              <a:t> 2008) Nodes: 2 Cores/Node: 8 Total Cores: 32</a:t>
             </a:r>
             <a:endParaRPr lang="en-US" dirty="0"/>
           </a:p>
@@ -5732,7 +7972,7 @@
     </p:spTree>
     <p:extLst>
       <p:ext uri="{BB962C8B-B14F-4D97-AF65-F5344CB8AC3E}">
-        <p14:creationId xmlns:p14="http://schemas.microsoft.com/office/powerpoint/2010/main" val="4256941685"/>
+        <p14:creationId xmlns:p14="http://schemas.microsoft.com/office/powerpoint/2010/main" val="2755411471"/>
       </p:ext>
     </p:extLst>
   </p:cSld>

</xml_diff>